<commit_message>
change the set of the original V1 and modify the ppt
</commit_message>
<xml_diff>
--- a/COMP0118 presentation.pptx
+++ b/COMP0118 presentation.pptx
@@ -1,22 +1,23 @@
 
 <file path=ppt/presentation.xml><?xml version="1.0" encoding="utf-8"?>
-<p:presentation xmlns:a="http://schemas.openxmlformats.org/drawingml/2006/main" xmlns:r="http://schemas.openxmlformats.org/officeDocument/2006/relationships" xmlns:p="http://schemas.openxmlformats.org/presentationml/2006/main" saveSubsetFonts="1">
+<p:presentation xmlns:a="http://schemas.openxmlformats.org/drawingml/2006/main" xmlns:r="http://schemas.openxmlformats.org/officeDocument/2006/relationships" xmlns:p="http://schemas.openxmlformats.org/presentationml/2006/main">
   <p:sldMasterIdLst>
-    <p:sldMasterId id="2147483696" r:id="rId1"/>
+    <p:sldMasterId id="2147483648" r:id="rId1"/>
   </p:sldMasterIdLst>
   <p:notesMasterIdLst>
-    <p:notesMasterId r:id="rId11"/>
+    <p:notesMasterId r:id="rId10"/>
   </p:notesMasterIdLst>
   <p:sldIdLst>
-    <p:sldId id="256" r:id="rId2"/>
-    <p:sldId id="257" r:id="rId3"/>
-    <p:sldId id="258" r:id="rId4"/>
-    <p:sldId id="259" r:id="rId5"/>
-    <p:sldId id="260" r:id="rId6"/>
-    <p:sldId id="261" r:id="rId7"/>
-    <p:sldId id="262" r:id="rId8"/>
-    <p:sldId id="263" r:id="rId9"/>
-    <p:sldId id="264" r:id="rId10"/>
+    <p:sldId id="256" r:id="rId3"/>
+    <p:sldId id="257" r:id="rId4"/>
+    <p:sldId id="258" r:id="rId5"/>
+    <p:sldId id="259" r:id="rId6"/>
+    <p:sldId id="260" r:id="rId7"/>
+    <p:sldId id="261" r:id="rId8"/>
+    <p:sldId id="265" r:id="rId9"/>
+    <p:sldId id="262" r:id="rId11"/>
+    <p:sldId id="263" r:id="rId12"/>
+    <p:sldId id="264" r:id="rId13"/>
   </p:sldIdLst>
   <p:sldSz cx="12192000" cy="6858000"/>
   <p:notesSz cx="6858000" cy="9144000"/>
@@ -200,7 +201,6 @@
           <a:p>
             <a:fld id="{7A0D58AA-F1DD-4E10-BBB1-CE20A62D337F}" type="datetimeFigureOut">
               <a:rPr lang="fr-FR" smtClean="0"/>
-              <a:t>24/03/2025</a:t>
             </a:fld>
             <a:endParaRPr lang="fr-FR"/>
           </a:p>
@@ -267,6 +267,7 @@
               <a:rPr lang="it-IT"/>
               <a:t>Modifica gli stili del testo dello schema</a:t>
             </a:r>
+            <a:endParaRPr lang="it-IT"/>
           </a:p>
           <a:p>
             <a:pPr lvl="1"/>
@@ -274,6 +275,7 @@
               <a:rPr lang="it-IT"/>
               <a:t>Secondo livello</a:t>
             </a:r>
+            <a:endParaRPr lang="it-IT"/>
           </a:p>
           <a:p>
             <a:pPr lvl="2"/>
@@ -281,6 +283,7 @@
               <a:rPr lang="it-IT"/>
               <a:t>Terzo livello</a:t>
             </a:r>
+            <a:endParaRPr lang="it-IT"/>
           </a:p>
           <a:p>
             <a:pPr lvl="3"/>
@@ -288,6 +291,7 @@
               <a:rPr lang="it-IT"/>
               <a:t>Quarto livello</a:t>
             </a:r>
+            <a:endParaRPr lang="it-IT"/>
           </a:p>
           <a:p>
             <a:pPr lvl="4"/>
@@ -359,18 +363,12 @@
           <a:p>
             <a:fld id="{A9F36F4E-5DB7-4120-9E5B-1F0E3711E57A}" type="slidenum">
               <a:rPr lang="fr-FR" smtClean="0"/>
-              <a:t>‹N›</a:t>
             </a:fld>
             <a:endParaRPr lang="fr-FR"/>
           </a:p>
         </p:txBody>
       </p:sp>
     </p:spTree>
-    <p:extLst>
-      <p:ext uri="{BB962C8B-B14F-4D97-AF65-F5344CB8AC3E}">
-        <p14:creationId xmlns:p14="http://schemas.microsoft.com/office/powerpoint/2010/main" val="2037639889"/>
-      </p:ext>
-    </p:extLst>
   </p:cSld>
   <p:clrMap bg1="lt1" tx1="dk1" bg2="lt2" tx2="dk2" accent1="accent1" accent2="accent2" accent3="accent3" accent4="accent4" accent5="accent5" accent6="accent6" hlink="hlink" folHlink="folHlink"/>
   <p:notesStyle>
@@ -468,6 +466,58 @@
 </p:notesMaster>
 </file>
 
+<file path=ppt/notesSlides/notesSlide1.xml><?xml version="1.0" encoding="utf-8"?>
+<p:notes xmlns:a="http://schemas.openxmlformats.org/drawingml/2006/main" xmlns:r="http://schemas.openxmlformats.org/officeDocument/2006/relationships" xmlns:p="http://schemas.openxmlformats.org/presentationml/2006/main">
+  <p:cSld>
+    <p:spTree>
+      <p:nvGrpSpPr>
+        <p:cNvPr id="1" name=""/>
+        <p:cNvGrpSpPr/>
+        <p:nvPr/>
+      </p:nvGrpSpPr>
+      <p:grpSpPr/>
+      <p:sp>
+        <p:nvSpPr>
+          <p:cNvPr id="2" name="幻灯片图像占位符 1"/>
+          <p:cNvSpPr>
+            <a:spLocks noGrp="1"/>
+          </p:cNvSpPr>
+          <p:nvPr>
+            <p:ph type="sldImg" idx="2"/>
+          </p:nvPr>
+        </p:nvSpPr>
+        <p:spPr/>
+      </p:sp>
+      <p:sp>
+        <p:nvSpPr>
+          <p:cNvPr id="3" name="文本占位符 2"/>
+          <p:cNvSpPr>
+            <a:spLocks noGrp="1"/>
+          </p:cNvSpPr>
+          <p:nvPr>
+            <p:ph type="body" idx="3"/>
+          </p:nvPr>
+        </p:nvSpPr>
+        <p:spPr/>
+        <p:txBody>
+          <a:bodyPr/>
+          <a:p>
+            <a:r>
+              <a:rPr lang="en-US" altLang="zh-CN"/>
+              <a:t>First, the three regions have similar short T2 components, about 30-35, which is in the range of typical myelin water (10-50 ms). The white matter region shows a short T2 component of about 35.2 milliseconds, a long T2 component of about 81.5 milliseconds, and a myelin water fraction (V1) of 0.313. It shows the highest short T2 component volume fraction V, which is consistent with its high myelin content. The gray matter region has a significantly longer long T2 component (117 milliseconds), and the myelin water fraction drops to 0.267. Reflecting the lower myelin content of gray matter. The long T2 component of CSF reaches over 500 milliseconds, which is much higher than other tissues, consistent with its fluid characteristics. The confidence intervals for all measured parameters are narrow, indicating that the estimates have good statistic stability.</a:t>
+            </a:r>
+            <a:endParaRPr lang="en-US" altLang="zh-CN"/>
+          </a:p>
+        </p:txBody>
+      </p:sp>
+    </p:spTree>
+  </p:cSld>
+  <p:clrMapOvr>
+    <a:masterClrMapping/>
+  </p:clrMapOvr>
+</p:notes>
+</file>
+
 <file path=ppt/slideLayouts/slideLayout1.xml><?xml version="1.0" encoding="utf-8"?>
 <p:sldLayout xmlns:a="http://schemas.openxmlformats.org/drawingml/2006/main" xmlns:r="http://schemas.openxmlformats.org/officeDocument/2006/relationships" xmlns:p="http://schemas.openxmlformats.org/presentationml/2006/main" type="title" preserve="1">
   <p:cSld name="Diapositiva titolo">
@@ -492,7 +542,7 @@
             <a:spLocks noGrp="1"/>
           </p:cNvSpPr>
           <p:nvPr>
-            <p:ph type="ctrTitle"/>
+            <p:ph type="ctrTitle" hasCustomPrompt="1"/>
           </p:nvPr>
         </p:nvSpPr>
         <p:spPr>
@@ -524,7 +574,7 @@
             <a:spLocks noGrp="1"/>
           </p:cNvSpPr>
           <p:nvPr>
-            <p:ph type="subTitle" idx="1"/>
+            <p:ph type="subTitle" idx="1" hasCustomPrompt="1"/>
           </p:nvPr>
         </p:nvSpPr>
         <p:spPr>
@@ -651,7 +701,6 @@
           <a:p>
             <a:fld id="{D68B88D4-16F0-4136-A526-B8CBDAEB6E3A}" type="datetimeFigureOut">
               <a:rPr lang="fr-FR" smtClean="0"/>
-              <a:t>24/03/2025</a:t>
             </a:fld>
             <a:endParaRPr lang="fr-FR"/>
           </a:p>
@@ -693,18 +742,12 @@
           <a:p>
             <a:fld id="{AE7AF604-DA45-4815-B79D-C24CE29D852D}" type="slidenum">
               <a:rPr lang="fr-FR" smtClean="0"/>
-              <a:t>‹N›</a:t>
             </a:fld>
             <a:endParaRPr lang="fr-FR"/>
           </a:p>
         </p:txBody>
       </p:sp>
     </p:spTree>
-    <p:extLst>
-      <p:ext uri="{BB962C8B-B14F-4D97-AF65-F5344CB8AC3E}">
-        <p14:creationId xmlns:p14="http://schemas.microsoft.com/office/powerpoint/2010/main" val="4143252597"/>
-      </p:ext>
-    </p:extLst>
   </p:cSld>
   <p:clrMapOvr>
     <a:masterClrMapping/>
@@ -736,7 +779,7 @@
             <a:spLocks noGrp="1"/>
           </p:cNvSpPr>
           <p:nvPr>
-            <p:ph type="title"/>
+            <p:ph type="title" hasCustomPrompt="1"/>
           </p:nvPr>
         </p:nvSpPr>
         <p:spPr>
@@ -770,7 +813,7 @@
             <a:spLocks noGrp="1" noChangeAspect="1"/>
           </p:cNvSpPr>
           <p:nvPr>
-            <p:ph type="pic" idx="1"/>
+            <p:ph type="pic" idx="1" hasCustomPrompt="1"/>
           </p:nvPr>
         </p:nvSpPr>
         <p:spPr>
@@ -849,7 +892,7 @@
             <a:spLocks noGrp="1"/>
           </p:cNvSpPr>
           <p:nvPr>
-            <p:ph type="body" sz="half" idx="2"/>
+            <p:ph type="body" sz="half" idx="2" hasCustomPrompt="1"/>
           </p:nvPr>
         </p:nvSpPr>
         <p:spPr>
@@ -906,6 +949,7 @@
               <a:rPr lang="it-IT"/>
               <a:t>Modifica gli stili del testo dello schema</a:t>
             </a:r>
+            <a:endParaRPr lang="it-IT"/>
           </a:p>
         </p:txBody>
       </p:sp>
@@ -926,7 +970,6 @@
           <a:p>
             <a:fld id="{D68B88D4-16F0-4136-A526-B8CBDAEB6E3A}" type="datetimeFigureOut">
               <a:rPr lang="fr-FR" smtClean="0"/>
-              <a:t>24/03/2025</a:t>
             </a:fld>
             <a:endParaRPr lang="fr-FR"/>
           </a:p>
@@ -968,18 +1011,12 @@
           <a:p>
             <a:fld id="{AE7AF604-DA45-4815-B79D-C24CE29D852D}" type="slidenum">
               <a:rPr lang="fr-FR" smtClean="0"/>
-              <a:t>‹N›</a:t>
             </a:fld>
             <a:endParaRPr lang="fr-FR"/>
           </a:p>
         </p:txBody>
       </p:sp>
     </p:spTree>
-    <p:extLst>
-      <p:ext uri="{BB962C8B-B14F-4D97-AF65-F5344CB8AC3E}">
-        <p14:creationId xmlns:p14="http://schemas.microsoft.com/office/powerpoint/2010/main" val="249770798"/>
-      </p:ext>
-    </p:extLst>
   </p:cSld>
   <p:clrMapOvr>
     <a:masterClrMapping/>
@@ -1011,7 +1048,7 @@
             <a:spLocks noGrp="1"/>
           </p:cNvSpPr>
           <p:nvPr>
-            <p:ph type="title"/>
+            <p:ph type="title" hasCustomPrompt="1"/>
           </p:nvPr>
         </p:nvSpPr>
         <p:spPr>
@@ -1043,7 +1080,7 @@
             <a:spLocks noGrp="1"/>
           </p:cNvSpPr>
           <p:nvPr>
-            <p:ph type="body" sz="half" idx="2"/>
+            <p:ph type="body" sz="half" idx="2" hasCustomPrompt="1"/>
           </p:nvPr>
         </p:nvSpPr>
         <p:spPr>
@@ -1100,6 +1137,7 @@
               <a:rPr lang="it-IT"/>
               <a:t>Modifica gli stili del testo dello schema</a:t>
             </a:r>
+            <a:endParaRPr lang="it-IT"/>
           </a:p>
         </p:txBody>
       </p:sp>
@@ -1120,7 +1158,6 @@
           <a:p>
             <a:fld id="{D68B88D4-16F0-4136-A526-B8CBDAEB6E3A}" type="datetimeFigureOut">
               <a:rPr lang="fr-FR" smtClean="0"/>
-              <a:t>24/03/2025</a:t>
             </a:fld>
             <a:endParaRPr lang="fr-FR"/>
           </a:p>
@@ -1162,18 +1199,12 @@
           <a:p>
             <a:fld id="{AE7AF604-DA45-4815-B79D-C24CE29D852D}" type="slidenum">
               <a:rPr lang="fr-FR" smtClean="0"/>
-              <a:t>‹N›</a:t>
             </a:fld>
             <a:endParaRPr lang="fr-FR"/>
           </a:p>
         </p:txBody>
       </p:sp>
     </p:spTree>
-    <p:extLst>
-      <p:ext uri="{BB962C8B-B14F-4D97-AF65-F5344CB8AC3E}">
-        <p14:creationId xmlns:p14="http://schemas.microsoft.com/office/powerpoint/2010/main" val="2001867817"/>
-      </p:ext>
-    </p:extLst>
   </p:cSld>
   <p:clrMapOvr>
     <a:masterClrMapping/>
@@ -1205,7 +1236,7 @@
             <a:spLocks noGrp="1"/>
           </p:cNvSpPr>
           <p:nvPr>
-            <p:ph type="title"/>
+            <p:ph type="title" hasCustomPrompt="1"/>
           </p:nvPr>
         </p:nvSpPr>
         <p:spPr>
@@ -1237,7 +1268,7 @@
             <a:spLocks noGrp="1"/>
           </p:cNvSpPr>
           <p:nvPr>
-            <p:ph type="body" sz="half" idx="13"/>
+            <p:ph type="body" sz="half" idx="13" hasCustomPrompt="1"/>
           </p:nvPr>
         </p:nvSpPr>
         <p:spPr>
@@ -1301,6 +1332,7 @@
               <a:rPr lang="it-IT"/>
               <a:t>Modifica gli stili del testo dello schema</a:t>
             </a:r>
+            <a:endParaRPr lang="it-IT"/>
           </a:p>
         </p:txBody>
       </p:sp>
@@ -1311,7 +1343,7 @@
             <a:spLocks noGrp="1"/>
           </p:cNvSpPr>
           <p:nvPr>
-            <p:ph type="body" sz="half" idx="2"/>
+            <p:ph type="body" sz="half" idx="2" hasCustomPrompt="1"/>
           </p:nvPr>
         </p:nvSpPr>
         <p:spPr>
@@ -1368,6 +1400,7 @@
               <a:rPr lang="it-IT"/>
               <a:t>Modifica gli stili del testo dello schema</a:t>
             </a:r>
+            <a:endParaRPr lang="it-IT"/>
           </a:p>
         </p:txBody>
       </p:sp>
@@ -1388,7 +1421,6 @@
           <a:p>
             <a:fld id="{D68B88D4-16F0-4136-A526-B8CBDAEB6E3A}" type="datetimeFigureOut">
               <a:rPr lang="fr-FR" smtClean="0"/>
-              <a:t>24/03/2025</a:t>
             </a:fld>
             <a:endParaRPr lang="fr-FR"/>
           </a:p>
@@ -1430,7 +1462,6 @@
           <a:p>
             <a:fld id="{AE7AF604-DA45-4815-B79D-C24CE29D852D}" type="slidenum">
               <a:rPr lang="fr-FR" smtClean="0"/>
-              <a:t>‹N›</a:t>
             </a:fld>
             <a:endParaRPr lang="fr-FR"/>
           </a:p>
@@ -1465,7 +1496,7 @@
                 <a:solidFill>
                   <a:schemeClr val="accent1"/>
                 </a:solidFill>
-                <a:latin typeface="Arial"/>
+                <a:latin typeface="Arial" panose="020B0704020202020204"/>
                 <a:ea typeface="+mj-ea"/>
                 <a:cs typeface="+mj-cs"/>
               </a:defRPr>
@@ -1477,6 +1508,7 @@
               <a:rPr lang="en-US" dirty="0"/>
               <a:t>“</a:t>
             </a:r>
+            <a:endParaRPr lang="en-US" dirty="0"/>
           </a:p>
         </p:txBody>
       </p:sp>
@@ -1509,7 +1541,7 @@
                 <a:solidFill>
                   <a:schemeClr val="accent1"/>
                 </a:solidFill>
-                <a:latin typeface="Arial"/>
+                <a:latin typeface="Arial" panose="020B0704020202020204"/>
                 <a:ea typeface="+mj-ea"/>
                 <a:cs typeface="+mj-cs"/>
               </a:defRPr>
@@ -1521,15 +1553,11 @@
               <a:rPr lang="en-US" dirty="0"/>
               <a:t>”</a:t>
             </a:r>
+            <a:endParaRPr lang="en-US" dirty="0"/>
           </a:p>
         </p:txBody>
       </p:sp>
     </p:spTree>
-    <p:extLst>
-      <p:ext uri="{BB962C8B-B14F-4D97-AF65-F5344CB8AC3E}">
-        <p14:creationId xmlns:p14="http://schemas.microsoft.com/office/powerpoint/2010/main" val="1953039339"/>
-      </p:ext>
-    </p:extLst>
   </p:cSld>
   <p:clrMapOvr>
     <a:masterClrMapping/>
@@ -1561,7 +1589,7 @@
             <a:spLocks noGrp="1"/>
           </p:cNvSpPr>
           <p:nvPr>
-            <p:ph type="title"/>
+            <p:ph type="title" hasCustomPrompt="1"/>
           </p:nvPr>
         </p:nvSpPr>
         <p:spPr>
@@ -1593,7 +1621,7 @@
             <a:spLocks noGrp="1"/>
           </p:cNvSpPr>
           <p:nvPr>
-            <p:ph type="body" idx="1"/>
+            <p:ph type="body" idx="1" hasCustomPrompt="1"/>
           </p:nvPr>
         </p:nvSpPr>
         <p:spPr>
@@ -1700,6 +1728,7 @@
               <a:rPr lang="it-IT"/>
               <a:t>Modifica gli stili del testo dello schema</a:t>
             </a:r>
+            <a:endParaRPr lang="it-IT"/>
           </a:p>
         </p:txBody>
       </p:sp>
@@ -1720,7 +1749,6 @@
           <a:p>
             <a:fld id="{D68B88D4-16F0-4136-A526-B8CBDAEB6E3A}" type="datetimeFigureOut">
               <a:rPr lang="fr-FR" smtClean="0"/>
-              <a:t>24/03/2025</a:t>
             </a:fld>
             <a:endParaRPr lang="fr-FR"/>
           </a:p>
@@ -1762,18 +1790,12 @@
           <a:p>
             <a:fld id="{AE7AF604-DA45-4815-B79D-C24CE29D852D}" type="slidenum">
               <a:rPr lang="fr-FR" smtClean="0"/>
-              <a:t>‹N›</a:t>
             </a:fld>
             <a:endParaRPr lang="fr-FR"/>
           </a:p>
         </p:txBody>
       </p:sp>
     </p:spTree>
-    <p:extLst>
-      <p:ext uri="{BB962C8B-B14F-4D97-AF65-F5344CB8AC3E}">
-        <p14:creationId xmlns:p14="http://schemas.microsoft.com/office/powerpoint/2010/main" val="4109856253"/>
-      </p:ext>
-    </p:extLst>
   </p:cSld>
   <p:clrMapOvr>
     <a:masterClrMapping/>
@@ -1805,7 +1827,7 @@
             <a:spLocks noGrp="1"/>
           </p:cNvSpPr>
           <p:nvPr>
-            <p:ph type="title"/>
+            <p:ph type="title" hasCustomPrompt="1"/>
           </p:nvPr>
         </p:nvSpPr>
         <p:spPr/>
@@ -1832,7 +1854,7 @@
             <a:spLocks noGrp="1"/>
           </p:cNvSpPr>
           <p:nvPr>
-            <p:ph type="body" idx="1"/>
+            <p:ph type="body" idx="1" hasCustomPrompt="1"/>
           </p:nvPr>
         </p:nvSpPr>
         <p:spPr>
@@ -1893,6 +1915,7 @@
               <a:rPr lang="it-IT"/>
               <a:t>Modifica gli stili del testo dello schema</a:t>
             </a:r>
+            <a:endParaRPr lang="it-IT"/>
           </a:p>
         </p:txBody>
       </p:sp>
@@ -1903,7 +1926,7 @@
             <a:spLocks noGrp="1"/>
           </p:cNvSpPr>
           <p:nvPr>
-            <p:ph type="body" sz="half" idx="15"/>
+            <p:ph type="body" sz="half" idx="15" hasCustomPrompt="1"/>
           </p:nvPr>
         </p:nvSpPr>
         <p:spPr>
@@ -1960,6 +1983,7 @@
               <a:rPr lang="it-IT"/>
               <a:t>Modifica gli stili del testo dello schema</a:t>
             </a:r>
+            <a:endParaRPr lang="it-IT"/>
           </a:p>
         </p:txBody>
       </p:sp>
@@ -1970,7 +1994,7 @@
             <a:spLocks noGrp="1"/>
           </p:cNvSpPr>
           <p:nvPr>
-            <p:ph type="body" sz="quarter" idx="3"/>
+            <p:ph type="body" sz="quarter" idx="3" hasCustomPrompt="1"/>
           </p:nvPr>
         </p:nvSpPr>
         <p:spPr>
@@ -2031,6 +2055,7 @@
               <a:rPr lang="it-IT"/>
               <a:t>Modifica gli stili del testo dello schema</a:t>
             </a:r>
+            <a:endParaRPr lang="it-IT"/>
           </a:p>
         </p:txBody>
       </p:sp>
@@ -2041,7 +2066,7 @@
             <a:spLocks noGrp="1"/>
           </p:cNvSpPr>
           <p:nvPr>
-            <p:ph type="body" sz="half" idx="16"/>
+            <p:ph type="body" sz="half" idx="16" hasCustomPrompt="1"/>
           </p:nvPr>
         </p:nvSpPr>
         <p:spPr>
@@ -2098,6 +2123,7 @@
               <a:rPr lang="it-IT"/>
               <a:t>Modifica gli stili del testo dello schema</a:t>
             </a:r>
+            <a:endParaRPr lang="it-IT"/>
           </a:p>
         </p:txBody>
       </p:sp>
@@ -2108,7 +2134,7 @@
             <a:spLocks noGrp="1"/>
           </p:cNvSpPr>
           <p:nvPr>
-            <p:ph type="body" sz="quarter" idx="13"/>
+            <p:ph type="body" sz="quarter" idx="13" hasCustomPrompt="1"/>
           </p:nvPr>
         </p:nvSpPr>
         <p:spPr>
@@ -2169,6 +2195,7 @@
               <a:rPr lang="it-IT"/>
               <a:t>Modifica gli stili del testo dello schema</a:t>
             </a:r>
+            <a:endParaRPr lang="it-IT"/>
           </a:p>
         </p:txBody>
       </p:sp>
@@ -2179,7 +2206,7 @@
             <a:spLocks noGrp="1"/>
           </p:cNvSpPr>
           <p:nvPr>
-            <p:ph type="body" sz="half" idx="17"/>
+            <p:ph type="body" sz="half" idx="17" hasCustomPrompt="1"/>
           </p:nvPr>
         </p:nvSpPr>
         <p:spPr>
@@ -2236,6 +2263,7 @@
               <a:rPr lang="it-IT"/>
               <a:t>Modifica gli stili del testo dello schema</a:t>
             </a:r>
+            <a:endParaRPr lang="it-IT"/>
           </a:p>
         </p:txBody>
       </p:sp>
@@ -2330,7 +2358,6 @@
           <a:p>
             <a:fld id="{D68B88D4-16F0-4136-A526-B8CBDAEB6E3A}" type="datetimeFigureOut">
               <a:rPr lang="fr-FR" smtClean="0"/>
-              <a:t>24/03/2025</a:t>
             </a:fld>
             <a:endParaRPr lang="fr-FR"/>
           </a:p>
@@ -2372,18 +2399,12 @@
           <a:p>
             <a:fld id="{AE7AF604-DA45-4815-B79D-C24CE29D852D}" type="slidenum">
               <a:rPr lang="fr-FR" smtClean="0"/>
-              <a:t>‹N›</a:t>
             </a:fld>
             <a:endParaRPr lang="fr-FR"/>
           </a:p>
         </p:txBody>
       </p:sp>
     </p:spTree>
-    <p:extLst>
-      <p:ext uri="{BB962C8B-B14F-4D97-AF65-F5344CB8AC3E}">
-        <p14:creationId xmlns:p14="http://schemas.microsoft.com/office/powerpoint/2010/main" val="2681318653"/>
-      </p:ext>
-    </p:extLst>
   </p:cSld>
   <p:clrMapOvr>
     <a:masterClrMapping/>
@@ -2415,7 +2436,7 @@
             <a:spLocks noGrp="1"/>
           </p:cNvSpPr>
           <p:nvPr>
-            <p:ph type="title"/>
+            <p:ph type="title" hasCustomPrompt="1"/>
           </p:nvPr>
         </p:nvSpPr>
         <p:spPr/>
@@ -2442,7 +2463,7 @@
             <a:spLocks noGrp="1"/>
           </p:cNvSpPr>
           <p:nvPr>
-            <p:ph type="body" idx="1"/>
+            <p:ph type="body" idx="1" hasCustomPrompt="1"/>
           </p:nvPr>
         </p:nvSpPr>
         <p:spPr>
@@ -2503,6 +2524,7 @@
               <a:rPr lang="it-IT"/>
               <a:t>Modifica gli stili del testo dello schema</a:t>
             </a:r>
+            <a:endParaRPr lang="it-IT"/>
           </a:p>
         </p:txBody>
       </p:sp>
@@ -2513,7 +2535,7 @@
             <a:spLocks noGrp="1" noChangeAspect="1"/>
           </p:cNvSpPr>
           <p:nvPr>
-            <p:ph type="pic" idx="15"/>
+            <p:ph type="pic" idx="15" hasCustomPrompt="1"/>
           </p:nvPr>
         </p:nvSpPr>
         <p:spPr>
@@ -2592,7 +2614,7 @@
             <a:spLocks noGrp="1"/>
           </p:cNvSpPr>
           <p:nvPr>
-            <p:ph type="body" sz="half" idx="18"/>
+            <p:ph type="body" sz="half" idx="18" hasCustomPrompt="1"/>
           </p:nvPr>
         </p:nvSpPr>
         <p:spPr>
@@ -2649,6 +2671,7 @@
               <a:rPr lang="it-IT"/>
               <a:t>Modifica gli stili del testo dello schema</a:t>
             </a:r>
+            <a:endParaRPr lang="it-IT"/>
           </a:p>
         </p:txBody>
       </p:sp>
@@ -2659,7 +2682,7 @@
             <a:spLocks noGrp="1"/>
           </p:cNvSpPr>
           <p:nvPr>
-            <p:ph type="body" sz="quarter" idx="3"/>
+            <p:ph type="body" sz="quarter" idx="3" hasCustomPrompt="1"/>
           </p:nvPr>
         </p:nvSpPr>
         <p:spPr>
@@ -2720,6 +2743,7 @@
               <a:rPr lang="it-IT"/>
               <a:t>Modifica gli stili del testo dello schema</a:t>
             </a:r>
+            <a:endParaRPr lang="it-IT"/>
           </a:p>
         </p:txBody>
       </p:sp>
@@ -2730,7 +2754,7 @@
             <a:spLocks noGrp="1" noChangeAspect="1"/>
           </p:cNvSpPr>
           <p:nvPr>
-            <p:ph type="pic" idx="21"/>
+            <p:ph type="pic" idx="21" hasCustomPrompt="1"/>
           </p:nvPr>
         </p:nvSpPr>
         <p:spPr>
@@ -2809,7 +2833,7 @@
             <a:spLocks noGrp="1"/>
           </p:cNvSpPr>
           <p:nvPr>
-            <p:ph type="body" sz="half" idx="19"/>
+            <p:ph type="body" sz="half" idx="19" hasCustomPrompt="1"/>
           </p:nvPr>
         </p:nvSpPr>
         <p:spPr>
@@ -2866,6 +2890,7 @@
               <a:rPr lang="it-IT"/>
               <a:t>Modifica gli stili del testo dello schema</a:t>
             </a:r>
+            <a:endParaRPr lang="it-IT"/>
           </a:p>
         </p:txBody>
       </p:sp>
@@ -2876,7 +2901,7 @@
             <a:spLocks noGrp="1"/>
           </p:cNvSpPr>
           <p:nvPr>
-            <p:ph type="body" sz="quarter" idx="13"/>
+            <p:ph type="body" sz="quarter" idx="13" hasCustomPrompt="1"/>
           </p:nvPr>
         </p:nvSpPr>
         <p:spPr>
@@ -2937,6 +2962,7 @@
               <a:rPr lang="it-IT"/>
               <a:t>Modifica gli stili del testo dello schema</a:t>
             </a:r>
+            <a:endParaRPr lang="it-IT"/>
           </a:p>
         </p:txBody>
       </p:sp>
@@ -2947,7 +2973,7 @@
             <a:spLocks noGrp="1" noChangeAspect="1"/>
           </p:cNvSpPr>
           <p:nvPr>
-            <p:ph type="pic" idx="22"/>
+            <p:ph type="pic" idx="22" hasCustomPrompt="1"/>
           </p:nvPr>
         </p:nvSpPr>
         <p:spPr>
@@ -3026,7 +3052,7 @@
             <a:spLocks noGrp="1"/>
           </p:cNvSpPr>
           <p:nvPr>
-            <p:ph type="body" sz="half" idx="20"/>
+            <p:ph type="body" sz="half" idx="20" hasCustomPrompt="1"/>
           </p:nvPr>
         </p:nvSpPr>
         <p:spPr>
@@ -3083,6 +3109,7 @@
               <a:rPr lang="it-IT"/>
               <a:t>Modifica gli stili del testo dello schema</a:t>
             </a:r>
+            <a:endParaRPr lang="it-IT"/>
           </a:p>
         </p:txBody>
       </p:sp>
@@ -3177,7 +3204,6 @@
           <a:p>
             <a:fld id="{D68B88D4-16F0-4136-A526-B8CBDAEB6E3A}" type="datetimeFigureOut">
               <a:rPr lang="fr-FR" smtClean="0"/>
-              <a:t>24/03/2025</a:t>
             </a:fld>
             <a:endParaRPr lang="fr-FR"/>
           </a:p>
@@ -3219,18 +3245,12 @@
           <a:p>
             <a:fld id="{AE7AF604-DA45-4815-B79D-C24CE29D852D}" type="slidenum">
               <a:rPr lang="fr-FR" smtClean="0"/>
-              <a:t>‹N›</a:t>
             </a:fld>
             <a:endParaRPr lang="fr-FR"/>
           </a:p>
         </p:txBody>
       </p:sp>
     </p:spTree>
-    <p:extLst>
-      <p:ext uri="{BB962C8B-B14F-4D97-AF65-F5344CB8AC3E}">
-        <p14:creationId xmlns:p14="http://schemas.microsoft.com/office/powerpoint/2010/main" val="4034512142"/>
-      </p:ext>
-    </p:extLst>
   </p:cSld>
   <p:clrMapOvr>
     <a:masterClrMapping/>
@@ -3262,7 +3282,7 @@
             <a:spLocks noGrp="1"/>
           </p:cNvSpPr>
           <p:nvPr>
-            <p:ph type="title"/>
+            <p:ph type="title" hasCustomPrompt="1"/>
           </p:nvPr>
         </p:nvSpPr>
         <p:spPr/>
@@ -3285,7 +3305,7 @@
             <a:spLocks noGrp="1"/>
           </p:cNvSpPr>
           <p:nvPr>
-            <p:ph type="body" orient="vert" idx="1"/>
+            <p:ph type="body" orient="vert" idx="1" hasCustomPrompt="1"/>
           </p:nvPr>
         </p:nvSpPr>
         <p:spPr/>
@@ -3298,6 +3318,7 @@
               <a:rPr lang="it-IT"/>
               <a:t>Modifica gli stili del testo dello schema</a:t>
             </a:r>
+            <a:endParaRPr lang="it-IT"/>
           </a:p>
           <a:p>
             <a:pPr lvl="1"/>
@@ -3305,6 +3326,7 @@
               <a:rPr lang="it-IT"/>
               <a:t>Secondo livello</a:t>
             </a:r>
+            <a:endParaRPr lang="it-IT"/>
           </a:p>
           <a:p>
             <a:pPr lvl="2"/>
@@ -3312,6 +3334,7 @@
               <a:rPr lang="it-IT"/>
               <a:t>Terzo livello</a:t>
             </a:r>
+            <a:endParaRPr lang="it-IT"/>
           </a:p>
           <a:p>
             <a:pPr lvl="3"/>
@@ -3319,6 +3342,7 @@
               <a:rPr lang="it-IT"/>
               <a:t>Quarto livello</a:t>
             </a:r>
+            <a:endParaRPr lang="it-IT"/>
           </a:p>
           <a:p>
             <a:pPr lvl="4"/>
@@ -3347,7 +3371,6 @@
           <a:p>
             <a:fld id="{D68B88D4-16F0-4136-A526-B8CBDAEB6E3A}" type="datetimeFigureOut">
               <a:rPr lang="fr-FR" smtClean="0"/>
-              <a:t>24/03/2025</a:t>
             </a:fld>
             <a:endParaRPr lang="fr-FR"/>
           </a:p>
@@ -3389,18 +3412,12 @@
           <a:p>
             <a:fld id="{AE7AF604-DA45-4815-B79D-C24CE29D852D}" type="slidenum">
               <a:rPr lang="fr-FR" smtClean="0"/>
-              <a:t>‹N›</a:t>
             </a:fld>
             <a:endParaRPr lang="fr-FR"/>
           </a:p>
         </p:txBody>
       </p:sp>
     </p:spTree>
-    <p:extLst>
-      <p:ext uri="{BB962C8B-B14F-4D97-AF65-F5344CB8AC3E}">
-        <p14:creationId xmlns:p14="http://schemas.microsoft.com/office/powerpoint/2010/main" val="1597713159"/>
-      </p:ext>
-    </p:extLst>
   </p:cSld>
   <p:clrMapOvr>
     <a:masterClrMapping/>
@@ -3432,7 +3449,7 @@
             <a:spLocks noGrp="1"/>
           </p:cNvSpPr>
           <p:nvPr>
-            <p:ph type="title" orient="vert"/>
+            <p:ph type="title" orient="vert" hasCustomPrompt="1"/>
           </p:nvPr>
         </p:nvSpPr>
         <p:spPr>
@@ -3460,7 +3477,7 @@
             <a:spLocks noGrp="1"/>
           </p:cNvSpPr>
           <p:nvPr>
-            <p:ph type="body" orient="vert" idx="1"/>
+            <p:ph type="body" orient="vert" idx="1" hasCustomPrompt="1"/>
           </p:nvPr>
         </p:nvSpPr>
         <p:spPr>
@@ -3478,6 +3495,7 @@
               <a:rPr lang="it-IT"/>
               <a:t>Modifica gli stili del testo dello schema</a:t>
             </a:r>
+            <a:endParaRPr lang="it-IT"/>
           </a:p>
           <a:p>
             <a:pPr lvl="1"/>
@@ -3485,6 +3503,7 @@
               <a:rPr lang="it-IT"/>
               <a:t>Secondo livello</a:t>
             </a:r>
+            <a:endParaRPr lang="it-IT"/>
           </a:p>
           <a:p>
             <a:pPr lvl="2"/>
@@ -3492,6 +3511,7 @@
               <a:rPr lang="it-IT"/>
               <a:t>Terzo livello</a:t>
             </a:r>
+            <a:endParaRPr lang="it-IT"/>
           </a:p>
           <a:p>
             <a:pPr lvl="3"/>
@@ -3499,6 +3519,7 @@
               <a:rPr lang="it-IT"/>
               <a:t>Quarto livello</a:t>
             </a:r>
+            <a:endParaRPr lang="it-IT"/>
           </a:p>
           <a:p>
             <a:pPr lvl="4"/>
@@ -3527,7 +3548,6 @@
           <a:p>
             <a:fld id="{D68B88D4-16F0-4136-A526-B8CBDAEB6E3A}" type="datetimeFigureOut">
               <a:rPr lang="fr-FR" smtClean="0"/>
-              <a:t>24/03/2025</a:t>
             </a:fld>
             <a:endParaRPr lang="fr-FR"/>
           </a:p>
@@ -3569,18 +3589,12 @@
           <a:p>
             <a:fld id="{AE7AF604-DA45-4815-B79D-C24CE29D852D}" type="slidenum">
               <a:rPr lang="fr-FR" smtClean="0"/>
-              <a:t>‹N›</a:t>
             </a:fld>
             <a:endParaRPr lang="fr-FR"/>
           </a:p>
         </p:txBody>
       </p:sp>
     </p:spTree>
-    <p:extLst>
-      <p:ext uri="{BB962C8B-B14F-4D97-AF65-F5344CB8AC3E}">
-        <p14:creationId xmlns:p14="http://schemas.microsoft.com/office/powerpoint/2010/main" val="3522119645"/>
-      </p:ext>
-    </p:extLst>
   </p:cSld>
   <p:clrMapOvr>
     <a:masterClrMapping/>
@@ -3612,7 +3626,7 @@
             <a:spLocks noGrp="1"/>
           </p:cNvSpPr>
           <p:nvPr>
-            <p:ph type="title"/>
+            <p:ph type="title" hasCustomPrompt="1"/>
           </p:nvPr>
         </p:nvSpPr>
         <p:spPr/>
@@ -3635,7 +3649,7 @@
             <a:spLocks noGrp="1"/>
           </p:cNvSpPr>
           <p:nvPr>
-            <p:ph idx="1"/>
+            <p:ph idx="1" hasCustomPrompt="1"/>
           </p:nvPr>
         </p:nvSpPr>
         <p:spPr/>
@@ -3648,6 +3662,7 @@
               <a:rPr lang="it-IT"/>
               <a:t>Modifica gli stili del testo dello schema</a:t>
             </a:r>
+            <a:endParaRPr lang="it-IT"/>
           </a:p>
           <a:p>
             <a:pPr lvl="1"/>
@@ -3655,6 +3670,7 @@
               <a:rPr lang="it-IT"/>
               <a:t>Secondo livello</a:t>
             </a:r>
+            <a:endParaRPr lang="it-IT"/>
           </a:p>
           <a:p>
             <a:pPr lvl="2"/>
@@ -3662,6 +3678,7 @@
               <a:rPr lang="it-IT"/>
               <a:t>Terzo livello</a:t>
             </a:r>
+            <a:endParaRPr lang="it-IT"/>
           </a:p>
           <a:p>
             <a:pPr lvl="3"/>
@@ -3669,6 +3686,7 @@
               <a:rPr lang="it-IT"/>
               <a:t>Quarto livello</a:t>
             </a:r>
+            <a:endParaRPr lang="it-IT"/>
           </a:p>
           <a:p>
             <a:pPr lvl="4"/>
@@ -3697,7 +3715,6 @@
           <a:p>
             <a:fld id="{D68B88D4-16F0-4136-A526-B8CBDAEB6E3A}" type="datetimeFigureOut">
               <a:rPr lang="fr-FR" smtClean="0"/>
-              <a:t>24/03/2025</a:t>
             </a:fld>
             <a:endParaRPr lang="fr-FR"/>
           </a:p>
@@ -3739,18 +3756,12 @@
           <a:p>
             <a:fld id="{AE7AF604-DA45-4815-B79D-C24CE29D852D}" type="slidenum">
               <a:rPr lang="fr-FR" smtClean="0"/>
-              <a:t>‹N›</a:t>
             </a:fld>
             <a:endParaRPr lang="fr-FR"/>
           </a:p>
         </p:txBody>
       </p:sp>
     </p:spTree>
-    <p:extLst>
-      <p:ext uri="{BB962C8B-B14F-4D97-AF65-F5344CB8AC3E}">
-        <p14:creationId xmlns:p14="http://schemas.microsoft.com/office/powerpoint/2010/main" val="1341303456"/>
-      </p:ext>
-    </p:extLst>
   </p:cSld>
   <p:clrMapOvr>
     <a:masterClrMapping/>
@@ -3782,7 +3793,7 @@
             <a:spLocks noGrp="1"/>
           </p:cNvSpPr>
           <p:nvPr>
-            <p:ph type="title"/>
+            <p:ph type="title" hasCustomPrompt="1"/>
           </p:nvPr>
         </p:nvSpPr>
         <p:spPr>
@@ -3814,7 +3825,7 @@
             <a:spLocks noGrp="1"/>
           </p:cNvSpPr>
           <p:nvPr>
-            <p:ph type="body" idx="1"/>
+            <p:ph type="body" idx="1" hasCustomPrompt="1"/>
           </p:nvPr>
         </p:nvSpPr>
         <p:spPr>
@@ -3921,6 +3932,7 @@
               <a:rPr lang="it-IT"/>
               <a:t>Modifica gli stili del testo dello schema</a:t>
             </a:r>
+            <a:endParaRPr lang="it-IT"/>
           </a:p>
         </p:txBody>
       </p:sp>
@@ -3941,7 +3953,6 @@
           <a:p>
             <a:fld id="{D68B88D4-16F0-4136-A526-B8CBDAEB6E3A}" type="datetimeFigureOut">
               <a:rPr lang="fr-FR" smtClean="0"/>
-              <a:t>24/03/2025</a:t>
             </a:fld>
             <a:endParaRPr lang="fr-FR"/>
           </a:p>
@@ -3983,18 +3994,12 @@
           <a:p>
             <a:fld id="{AE7AF604-DA45-4815-B79D-C24CE29D852D}" type="slidenum">
               <a:rPr lang="fr-FR" smtClean="0"/>
-              <a:t>‹N›</a:t>
             </a:fld>
             <a:endParaRPr lang="fr-FR"/>
           </a:p>
         </p:txBody>
       </p:sp>
     </p:spTree>
-    <p:extLst>
-      <p:ext uri="{BB962C8B-B14F-4D97-AF65-F5344CB8AC3E}">
-        <p14:creationId xmlns:p14="http://schemas.microsoft.com/office/powerpoint/2010/main" val="3867402052"/>
-      </p:ext>
-    </p:extLst>
   </p:cSld>
   <p:clrMapOvr>
     <a:masterClrMapping/>
@@ -4026,7 +4031,7 @@
             <a:spLocks noGrp="1"/>
           </p:cNvSpPr>
           <p:nvPr>
-            <p:ph type="title"/>
+            <p:ph type="title" hasCustomPrompt="1"/>
           </p:nvPr>
         </p:nvSpPr>
         <p:spPr/>
@@ -4049,7 +4054,7 @@
             <a:spLocks noGrp="1"/>
           </p:cNvSpPr>
           <p:nvPr>
-            <p:ph sz="half" idx="1"/>
+            <p:ph sz="half" idx="1" hasCustomPrompt="1"/>
           </p:nvPr>
         </p:nvSpPr>
         <p:spPr>
@@ -4097,6 +4102,7 @@
               <a:rPr lang="it-IT"/>
               <a:t>Modifica gli stili del testo dello schema</a:t>
             </a:r>
+            <a:endParaRPr lang="it-IT"/>
           </a:p>
           <a:p>
             <a:pPr lvl="1"/>
@@ -4104,6 +4110,7 @@
               <a:rPr lang="it-IT"/>
               <a:t>Secondo livello</a:t>
             </a:r>
+            <a:endParaRPr lang="it-IT"/>
           </a:p>
           <a:p>
             <a:pPr lvl="2"/>
@@ -4111,6 +4118,7 @@
               <a:rPr lang="it-IT"/>
               <a:t>Terzo livello</a:t>
             </a:r>
+            <a:endParaRPr lang="it-IT"/>
           </a:p>
           <a:p>
             <a:pPr lvl="3"/>
@@ -4118,6 +4126,7 @@
               <a:rPr lang="it-IT"/>
               <a:t>Quarto livello</a:t>
             </a:r>
+            <a:endParaRPr lang="it-IT"/>
           </a:p>
           <a:p>
             <a:pPr lvl="4"/>
@@ -4136,7 +4145,7 @@
             <a:spLocks noGrp="1"/>
           </p:cNvSpPr>
           <p:nvPr>
-            <p:ph sz="half" idx="2"/>
+            <p:ph sz="half" idx="2" hasCustomPrompt="1"/>
           </p:nvPr>
         </p:nvSpPr>
         <p:spPr>
@@ -4184,6 +4193,7 @@
               <a:rPr lang="it-IT"/>
               <a:t>Modifica gli stili del testo dello schema</a:t>
             </a:r>
+            <a:endParaRPr lang="it-IT"/>
           </a:p>
           <a:p>
             <a:pPr lvl="1"/>
@@ -4191,6 +4201,7 @@
               <a:rPr lang="it-IT"/>
               <a:t>Secondo livello</a:t>
             </a:r>
+            <a:endParaRPr lang="it-IT"/>
           </a:p>
           <a:p>
             <a:pPr lvl="2"/>
@@ -4198,6 +4209,7 @@
               <a:rPr lang="it-IT"/>
               <a:t>Terzo livello</a:t>
             </a:r>
+            <a:endParaRPr lang="it-IT"/>
           </a:p>
           <a:p>
             <a:pPr lvl="3"/>
@@ -4205,6 +4217,7 @@
               <a:rPr lang="it-IT"/>
               <a:t>Quarto livello</a:t>
             </a:r>
+            <a:endParaRPr lang="it-IT"/>
           </a:p>
           <a:p>
             <a:pPr lvl="4"/>
@@ -4233,7 +4246,6 @@
           <a:p>
             <a:fld id="{D68B88D4-16F0-4136-A526-B8CBDAEB6E3A}" type="datetimeFigureOut">
               <a:rPr lang="fr-FR" smtClean="0"/>
-              <a:t>24/03/2025</a:t>
             </a:fld>
             <a:endParaRPr lang="fr-FR"/>
           </a:p>
@@ -4275,18 +4287,12 @@
           <a:p>
             <a:fld id="{AE7AF604-DA45-4815-B79D-C24CE29D852D}" type="slidenum">
               <a:rPr lang="fr-FR" smtClean="0"/>
-              <a:t>‹N›</a:t>
             </a:fld>
             <a:endParaRPr lang="fr-FR"/>
           </a:p>
         </p:txBody>
       </p:sp>
     </p:spTree>
-    <p:extLst>
-      <p:ext uri="{BB962C8B-B14F-4D97-AF65-F5344CB8AC3E}">
-        <p14:creationId xmlns:p14="http://schemas.microsoft.com/office/powerpoint/2010/main" val="3852677562"/>
-      </p:ext>
-    </p:extLst>
   </p:cSld>
   <p:clrMapOvr>
     <a:masterClrMapping/>
@@ -4318,7 +4324,7 @@
             <a:spLocks noGrp="1"/>
           </p:cNvSpPr>
           <p:nvPr>
-            <p:ph type="title"/>
+            <p:ph type="title" hasCustomPrompt="1"/>
           </p:nvPr>
         </p:nvSpPr>
         <p:spPr/>
@@ -4345,7 +4351,7 @@
             <a:spLocks noGrp="1"/>
           </p:cNvSpPr>
           <p:nvPr>
-            <p:ph type="body" idx="1"/>
+            <p:ph type="body" idx="1" hasCustomPrompt="1"/>
           </p:nvPr>
         </p:nvSpPr>
         <p:spPr>
@@ -4406,6 +4412,7 @@
               <a:rPr lang="it-IT"/>
               <a:t>Modifica gli stili del testo dello schema</a:t>
             </a:r>
+            <a:endParaRPr lang="it-IT"/>
           </a:p>
         </p:txBody>
       </p:sp>
@@ -4416,7 +4423,7 @@
             <a:spLocks noGrp="1"/>
           </p:cNvSpPr>
           <p:nvPr>
-            <p:ph sz="half" idx="2"/>
+            <p:ph sz="half" idx="2" hasCustomPrompt="1"/>
           </p:nvPr>
         </p:nvSpPr>
         <p:spPr>
@@ -4464,6 +4471,7 @@
               <a:rPr lang="it-IT"/>
               <a:t>Modifica gli stili del testo dello schema</a:t>
             </a:r>
+            <a:endParaRPr lang="it-IT"/>
           </a:p>
           <a:p>
             <a:pPr lvl="1"/>
@@ -4471,6 +4479,7 @@
               <a:rPr lang="it-IT"/>
               <a:t>Secondo livello</a:t>
             </a:r>
+            <a:endParaRPr lang="it-IT"/>
           </a:p>
           <a:p>
             <a:pPr lvl="2"/>
@@ -4478,6 +4487,7 @@
               <a:rPr lang="it-IT"/>
               <a:t>Terzo livello</a:t>
             </a:r>
+            <a:endParaRPr lang="it-IT"/>
           </a:p>
           <a:p>
             <a:pPr lvl="3"/>
@@ -4485,6 +4495,7 @@
               <a:rPr lang="it-IT"/>
               <a:t>Quarto livello</a:t>
             </a:r>
+            <a:endParaRPr lang="it-IT"/>
           </a:p>
           <a:p>
             <a:pPr lvl="4"/>
@@ -4503,7 +4514,7 @@
             <a:spLocks noGrp="1"/>
           </p:cNvSpPr>
           <p:nvPr>
-            <p:ph type="body" sz="quarter" idx="3"/>
+            <p:ph type="body" sz="quarter" idx="3" hasCustomPrompt="1"/>
           </p:nvPr>
         </p:nvSpPr>
         <p:spPr>
@@ -4564,6 +4575,7 @@
               <a:rPr lang="it-IT"/>
               <a:t>Modifica gli stili del testo dello schema</a:t>
             </a:r>
+            <a:endParaRPr lang="it-IT"/>
           </a:p>
         </p:txBody>
       </p:sp>
@@ -4574,7 +4586,7 @@
             <a:spLocks noGrp="1"/>
           </p:cNvSpPr>
           <p:nvPr>
-            <p:ph sz="quarter" idx="4"/>
+            <p:ph sz="quarter" idx="4" hasCustomPrompt="1"/>
           </p:nvPr>
         </p:nvSpPr>
         <p:spPr>
@@ -4622,6 +4634,7 @@
               <a:rPr lang="it-IT"/>
               <a:t>Modifica gli stili del testo dello schema</a:t>
             </a:r>
+            <a:endParaRPr lang="it-IT"/>
           </a:p>
           <a:p>
             <a:pPr lvl="1"/>
@@ -4629,6 +4642,7 @@
               <a:rPr lang="it-IT"/>
               <a:t>Secondo livello</a:t>
             </a:r>
+            <a:endParaRPr lang="it-IT"/>
           </a:p>
           <a:p>
             <a:pPr lvl="2"/>
@@ -4636,6 +4650,7 @@
               <a:rPr lang="it-IT"/>
               <a:t>Terzo livello</a:t>
             </a:r>
+            <a:endParaRPr lang="it-IT"/>
           </a:p>
           <a:p>
             <a:pPr lvl="3"/>
@@ -4643,6 +4658,7 @@
               <a:rPr lang="it-IT"/>
               <a:t>Quarto livello</a:t>
             </a:r>
+            <a:endParaRPr lang="it-IT"/>
           </a:p>
           <a:p>
             <a:pPr lvl="4"/>
@@ -4671,7 +4687,6 @@
           <a:p>
             <a:fld id="{D68B88D4-16F0-4136-A526-B8CBDAEB6E3A}" type="datetimeFigureOut">
               <a:rPr lang="fr-FR" smtClean="0"/>
-              <a:t>24/03/2025</a:t>
             </a:fld>
             <a:endParaRPr lang="fr-FR"/>
           </a:p>
@@ -4713,18 +4728,12 @@
           <a:p>
             <a:fld id="{AE7AF604-DA45-4815-B79D-C24CE29D852D}" type="slidenum">
               <a:rPr lang="fr-FR" smtClean="0"/>
-              <a:t>‹N›</a:t>
             </a:fld>
             <a:endParaRPr lang="fr-FR"/>
           </a:p>
         </p:txBody>
       </p:sp>
     </p:spTree>
-    <p:extLst>
-      <p:ext uri="{BB962C8B-B14F-4D97-AF65-F5344CB8AC3E}">
-        <p14:creationId xmlns:p14="http://schemas.microsoft.com/office/powerpoint/2010/main" val="4063212391"/>
-      </p:ext>
-    </p:extLst>
   </p:cSld>
   <p:clrMapOvr>
     <a:masterClrMapping/>
@@ -4756,7 +4765,7 @@
             <a:spLocks noGrp="1"/>
           </p:cNvSpPr>
           <p:nvPr>
-            <p:ph type="title"/>
+            <p:ph type="title" hasCustomPrompt="1"/>
           </p:nvPr>
         </p:nvSpPr>
         <p:spPr/>
@@ -4789,7 +4798,6 @@
           <a:p>
             <a:fld id="{D68B88D4-16F0-4136-A526-B8CBDAEB6E3A}" type="datetimeFigureOut">
               <a:rPr lang="fr-FR" smtClean="0"/>
-              <a:t>24/03/2025</a:t>
             </a:fld>
             <a:endParaRPr lang="fr-FR"/>
           </a:p>
@@ -4831,18 +4839,12 @@
           <a:p>
             <a:fld id="{AE7AF604-DA45-4815-B79D-C24CE29D852D}" type="slidenum">
               <a:rPr lang="fr-FR" smtClean="0"/>
-              <a:t>‹N›</a:t>
             </a:fld>
             <a:endParaRPr lang="fr-FR"/>
           </a:p>
         </p:txBody>
       </p:sp>
     </p:spTree>
-    <p:extLst>
-      <p:ext uri="{BB962C8B-B14F-4D97-AF65-F5344CB8AC3E}">
-        <p14:creationId xmlns:p14="http://schemas.microsoft.com/office/powerpoint/2010/main" val="1682938014"/>
-      </p:ext>
-    </p:extLst>
   </p:cSld>
   <p:clrMapOvr>
     <a:masterClrMapping/>
@@ -4884,7 +4886,6 @@
           <a:p>
             <a:fld id="{D68B88D4-16F0-4136-A526-B8CBDAEB6E3A}" type="datetimeFigureOut">
               <a:rPr lang="fr-FR" smtClean="0"/>
-              <a:t>24/03/2025</a:t>
             </a:fld>
             <a:endParaRPr lang="fr-FR"/>
           </a:p>
@@ -4926,18 +4927,12 @@
           <a:p>
             <a:fld id="{AE7AF604-DA45-4815-B79D-C24CE29D852D}" type="slidenum">
               <a:rPr lang="fr-FR" smtClean="0"/>
-              <a:t>‹N›</a:t>
             </a:fld>
             <a:endParaRPr lang="fr-FR"/>
           </a:p>
         </p:txBody>
       </p:sp>
     </p:spTree>
-    <p:extLst>
-      <p:ext uri="{BB962C8B-B14F-4D97-AF65-F5344CB8AC3E}">
-        <p14:creationId xmlns:p14="http://schemas.microsoft.com/office/powerpoint/2010/main" val="1658100411"/>
-      </p:ext>
-    </p:extLst>
   </p:cSld>
   <p:clrMapOvr>
     <a:masterClrMapping/>
@@ -4969,7 +4964,7 @@
             <a:spLocks noGrp="1"/>
           </p:cNvSpPr>
           <p:nvPr>
-            <p:ph type="title"/>
+            <p:ph type="title" hasCustomPrompt="1"/>
           </p:nvPr>
         </p:nvSpPr>
         <p:spPr>
@@ -5001,7 +4996,7 @@
             <a:spLocks noGrp="1"/>
           </p:cNvSpPr>
           <p:nvPr>
-            <p:ph idx="1"/>
+            <p:ph idx="1" hasCustomPrompt="1"/>
           </p:nvPr>
         </p:nvSpPr>
         <p:spPr>
@@ -5049,6 +5044,7 @@
               <a:rPr lang="it-IT"/>
               <a:t>Modifica gli stili del testo dello schema</a:t>
             </a:r>
+            <a:endParaRPr lang="it-IT"/>
           </a:p>
           <a:p>
             <a:pPr lvl="1"/>
@@ -5056,6 +5052,7 @@
               <a:rPr lang="it-IT"/>
               <a:t>Secondo livello</a:t>
             </a:r>
+            <a:endParaRPr lang="it-IT"/>
           </a:p>
           <a:p>
             <a:pPr lvl="2"/>
@@ -5063,6 +5060,7 @@
               <a:rPr lang="it-IT"/>
               <a:t>Terzo livello</a:t>
             </a:r>
+            <a:endParaRPr lang="it-IT"/>
           </a:p>
           <a:p>
             <a:pPr lvl="3"/>
@@ -5070,6 +5068,7 @@
               <a:rPr lang="it-IT"/>
               <a:t>Quarto livello</a:t>
             </a:r>
+            <a:endParaRPr lang="it-IT"/>
           </a:p>
           <a:p>
             <a:pPr lvl="4"/>
@@ -5088,7 +5087,7 @@
             <a:spLocks noGrp="1"/>
           </p:cNvSpPr>
           <p:nvPr>
-            <p:ph type="body" sz="half" idx="2"/>
+            <p:ph type="body" sz="half" idx="2" hasCustomPrompt="1"/>
           </p:nvPr>
         </p:nvSpPr>
         <p:spPr>
@@ -5143,6 +5142,7 @@
               <a:rPr lang="it-IT"/>
               <a:t>Modifica gli stili del testo dello schema</a:t>
             </a:r>
+            <a:endParaRPr lang="it-IT"/>
           </a:p>
         </p:txBody>
       </p:sp>
@@ -5163,7 +5163,6 @@
           <a:p>
             <a:fld id="{D68B88D4-16F0-4136-A526-B8CBDAEB6E3A}" type="datetimeFigureOut">
               <a:rPr lang="fr-FR" smtClean="0"/>
-              <a:t>24/03/2025</a:t>
             </a:fld>
             <a:endParaRPr lang="fr-FR"/>
           </a:p>
@@ -5205,18 +5204,12 @@
           <a:p>
             <a:fld id="{AE7AF604-DA45-4815-B79D-C24CE29D852D}" type="slidenum">
               <a:rPr lang="fr-FR" smtClean="0"/>
-              <a:t>‹N›</a:t>
             </a:fld>
             <a:endParaRPr lang="fr-FR"/>
           </a:p>
         </p:txBody>
       </p:sp>
     </p:spTree>
-    <p:extLst>
-      <p:ext uri="{BB962C8B-B14F-4D97-AF65-F5344CB8AC3E}">
-        <p14:creationId xmlns:p14="http://schemas.microsoft.com/office/powerpoint/2010/main" val="38876824"/>
-      </p:ext>
-    </p:extLst>
   </p:cSld>
   <p:clrMapOvr>
     <a:masterClrMapping/>
@@ -5248,7 +5241,7 @@
             <a:spLocks noGrp="1"/>
           </p:cNvSpPr>
           <p:nvPr>
-            <p:ph type="title"/>
+            <p:ph type="title" hasCustomPrompt="1"/>
           </p:nvPr>
         </p:nvSpPr>
         <p:spPr>
@@ -5282,7 +5275,7 @@
             <a:spLocks noGrp="1" noChangeAspect="1"/>
           </p:cNvSpPr>
           <p:nvPr>
-            <p:ph type="pic" idx="1"/>
+            <p:ph type="pic" idx="1" hasCustomPrompt="1"/>
           </p:nvPr>
         </p:nvSpPr>
         <p:spPr>
@@ -5361,7 +5354,7 @@
             <a:spLocks noGrp="1"/>
           </p:cNvSpPr>
           <p:nvPr>
-            <p:ph type="body" sz="half" idx="2"/>
+            <p:ph type="body" sz="half" idx="2" hasCustomPrompt="1"/>
           </p:nvPr>
         </p:nvSpPr>
         <p:spPr>
@@ -5418,6 +5411,7 @@
               <a:rPr lang="it-IT"/>
               <a:t>Modifica gli stili del testo dello schema</a:t>
             </a:r>
+            <a:endParaRPr lang="it-IT"/>
           </a:p>
         </p:txBody>
       </p:sp>
@@ -5438,7 +5432,6 @@
           <a:p>
             <a:fld id="{D68B88D4-16F0-4136-A526-B8CBDAEB6E3A}" type="datetimeFigureOut">
               <a:rPr lang="fr-FR" smtClean="0"/>
-              <a:t>24/03/2025</a:t>
             </a:fld>
             <a:endParaRPr lang="fr-FR"/>
           </a:p>
@@ -5480,18 +5473,12 @@
           <a:p>
             <a:fld id="{AE7AF604-DA45-4815-B79D-C24CE29D852D}" type="slidenum">
               <a:rPr lang="fr-FR" smtClean="0"/>
-              <a:t>‹N›</a:t>
             </a:fld>
             <a:endParaRPr lang="fr-FR"/>
           </a:p>
         </p:txBody>
       </p:sp>
     </p:spTree>
-    <p:extLst>
-      <p:ext uri="{BB962C8B-B14F-4D97-AF65-F5344CB8AC3E}">
-        <p14:creationId xmlns:p14="http://schemas.microsoft.com/office/powerpoint/2010/main" val="670074616"/>
-      </p:ext>
-    </p:extLst>
   </p:cSld>
   <p:clrMapOvr>
     <a:masterClrMapping/>
@@ -5530,7 +5517,7 @@
           <p:nvPr/>
         </p:nvPicPr>
         <p:blipFill rotWithShape="1">
-          <a:blip r:embed="rId19">
+          <a:blip r:embed="rId18">
             <a:extLst>
               <a:ext uri="{28A0092B-C50C-407E-A947-70E740481C1C}">
                 <a14:useLocalDpi xmlns:a14="http://schemas.microsoft.com/office/drawing/2010/main" val="0"/>
@@ -5538,7 +5525,9 @@
             </a:extLst>
           </a:blip>
           <a:srcRect l="3613"/>
-          <a:stretch/>
+          <a:stretch>
+            <a:fillRect/>
+          </a:stretch>
         </p:blipFill>
         <p:spPr>
           <a:xfrm>
@@ -5559,7 +5548,7 @@
           <p:nvPr/>
         </p:nvPicPr>
         <p:blipFill rotWithShape="1">
-          <a:blip r:embed="rId20">
+          <a:blip r:embed="rId19">
             <a:extLst>
               <a:ext uri="{28A0092B-C50C-407E-A947-70E740481C1C}">
                 <a14:useLocalDpi xmlns:a14="http://schemas.microsoft.com/office/drawing/2010/main" val="0"/>
@@ -5567,7 +5556,9 @@
             </a:extLst>
           </a:blip>
           <a:srcRect l="35640"/>
-          <a:stretch/>
+          <a:stretch>
+            <a:fillRect/>
+          </a:stretch>
         </p:blipFill>
         <p:spPr>
           <a:xfrm>
@@ -5651,7 +5642,7 @@
           <p:nvPr/>
         </p:nvPicPr>
         <p:blipFill rotWithShape="1">
-          <a:blip r:embed="rId21">
+          <a:blip r:embed="rId20">
             <a:extLst>
               <a:ext uri="{28A0092B-C50C-407E-A947-70E740481C1C}">
                 <a14:useLocalDpi xmlns:a14="http://schemas.microsoft.com/office/drawing/2010/main" val="0"/>
@@ -5659,7 +5650,9 @@
             </a:extLst>
           </a:blip>
           <a:srcRect t="28813"/>
-          <a:stretch/>
+          <a:stretch>
+            <a:fillRect/>
+          </a:stretch>
         </p:blipFill>
         <p:spPr>
           <a:xfrm>
@@ -5680,7 +5673,7 @@
           <p:nvPr/>
         </p:nvPicPr>
         <p:blipFill rotWithShape="1">
-          <a:blip r:embed="rId22">
+          <a:blip r:embed="rId21">
             <a:extLst>
               <a:ext uri="{28A0092B-C50C-407E-A947-70E740481C1C}">
                 <a14:useLocalDpi xmlns:a14="http://schemas.microsoft.com/office/drawing/2010/main" val="0"/>
@@ -5688,7 +5681,9 @@
             </a:extLst>
           </a:blip>
           <a:srcRect b="23320"/>
-          <a:stretch/>
+          <a:stretch>
+            <a:fillRect/>
+          </a:stretch>
         </p:blipFill>
         <p:spPr>
           <a:xfrm>
@@ -5799,6 +5794,7 @@
               <a:rPr lang="it-IT"/>
               <a:t>Modifica gli stili del testo dello schema</a:t>
             </a:r>
+            <a:endParaRPr lang="it-IT"/>
           </a:p>
           <a:p>
             <a:pPr lvl="1"/>
@@ -5806,6 +5802,7 @@
               <a:rPr lang="it-IT"/>
               <a:t>Secondo livello</a:t>
             </a:r>
+            <a:endParaRPr lang="it-IT"/>
           </a:p>
           <a:p>
             <a:pPr lvl="2"/>
@@ -5813,6 +5810,7 @@
               <a:rPr lang="it-IT"/>
               <a:t>Terzo livello</a:t>
             </a:r>
+            <a:endParaRPr lang="it-IT"/>
           </a:p>
           <a:p>
             <a:pPr lvl="3"/>
@@ -5820,6 +5818,7 @@
               <a:rPr lang="it-IT"/>
               <a:t>Quarto livello</a:t>
             </a:r>
+            <a:endParaRPr lang="it-IT"/>
           </a:p>
           <a:p>
             <a:pPr lvl="4"/>
@@ -5867,7 +5866,6 @@
           <a:p>
             <a:fld id="{D68B88D4-16F0-4136-A526-B8CBDAEB6E3A}" type="datetimeFigureOut">
               <a:rPr lang="fr-FR" smtClean="0"/>
-              <a:t>24/03/2025</a:t>
             </a:fld>
             <a:endParaRPr lang="fr-FR"/>
           </a:p>
@@ -5946,38 +5944,32 @@
           <a:p>
             <a:fld id="{AE7AF604-DA45-4815-B79D-C24CE29D852D}" type="slidenum">
               <a:rPr lang="fr-FR" smtClean="0"/>
-              <a:t>‹N›</a:t>
             </a:fld>
             <a:endParaRPr lang="fr-FR"/>
           </a:p>
         </p:txBody>
       </p:sp>
     </p:spTree>
-    <p:extLst>
-      <p:ext uri="{BB962C8B-B14F-4D97-AF65-F5344CB8AC3E}">
-        <p14:creationId xmlns:p14="http://schemas.microsoft.com/office/powerpoint/2010/main" val="1306412295"/>
-      </p:ext>
-    </p:extLst>
   </p:cSld>
   <p:clrMap bg1="dk1" tx1="lt1" bg2="dk2" tx2="lt2" accent1="accent1" accent2="accent2" accent3="accent3" accent4="accent4" accent5="accent5" accent6="accent6" hlink="hlink" folHlink="folHlink"/>
   <p:sldLayoutIdLst>
-    <p:sldLayoutId id="2147483697" r:id="rId1"/>
-    <p:sldLayoutId id="2147483698" r:id="rId2"/>
-    <p:sldLayoutId id="2147483699" r:id="rId3"/>
-    <p:sldLayoutId id="2147483700" r:id="rId4"/>
-    <p:sldLayoutId id="2147483701" r:id="rId5"/>
-    <p:sldLayoutId id="2147483702" r:id="rId6"/>
-    <p:sldLayoutId id="2147483703" r:id="rId7"/>
-    <p:sldLayoutId id="2147483704" r:id="rId8"/>
-    <p:sldLayoutId id="2147483705" r:id="rId9"/>
-    <p:sldLayoutId id="2147483706" r:id="rId10"/>
-    <p:sldLayoutId id="2147483707" r:id="rId11"/>
-    <p:sldLayoutId id="2147483708" r:id="rId12"/>
-    <p:sldLayoutId id="2147483709" r:id="rId13"/>
-    <p:sldLayoutId id="2147483710" r:id="rId14"/>
-    <p:sldLayoutId id="2147483711" r:id="rId15"/>
-    <p:sldLayoutId id="2147483712" r:id="rId16"/>
-    <p:sldLayoutId id="2147483713" r:id="rId17"/>
+    <p:sldLayoutId id="2147483649" r:id="rId1"/>
+    <p:sldLayoutId id="2147483650" r:id="rId2"/>
+    <p:sldLayoutId id="2147483651" r:id="rId3"/>
+    <p:sldLayoutId id="2147483652" r:id="rId4"/>
+    <p:sldLayoutId id="2147483653" r:id="rId5"/>
+    <p:sldLayoutId id="2147483654" r:id="rId6"/>
+    <p:sldLayoutId id="2147483655" r:id="rId7"/>
+    <p:sldLayoutId id="2147483656" r:id="rId8"/>
+    <p:sldLayoutId id="2147483657" r:id="rId9"/>
+    <p:sldLayoutId id="2147483658" r:id="rId10"/>
+    <p:sldLayoutId id="2147483659" r:id="rId11"/>
+    <p:sldLayoutId id="2147483660" r:id="rId12"/>
+    <p:sldLayoutId id="2147483661" r:id="rId13"/>
+    <p:sldLayoutId id="2147483662" r:id="rId14"/>
+    <p:sldLayoutId id="2147483663" r:id="rId15"/>
+    <p:sldLayoutId id="2147483664" r:id="rId16"/>
+    <p:sldLayoutId id="2147483665" r:id="rId17"/>
   </p:sldLayoutIdLst>
   <p:txStyles>
     <p:titleStyle>
@@ -6064,7 +6056,7 @@
           <a:schemeClr val="accent1"/>
         </a:buClr>
         <a:buSzPct val="80000"/>
-        <a:buFont typeface="Wingdings 3" charset="2"/>
+        <a:buFont typeface="Wingdings 3" panose="05040102010807070707" charset="2"/>
         <a:buChar char=""/>
         <a:defRPr sz="2000" b="0" i="0" kern="1200">
           <a:solidFill>
@@ -6086,7 +6078,7 @@
           <a:schemeClr val="accent1"/>
         </a:buClr>
         <a:buSzPct val="80000"/>
-        <a:buFont typeface="Wingdings 3" charset="2"/>
+        <a:buFont typeface="Wingdings 3" panose="05040102010807070707" charset="2"/>
         <a:buChar char=""/>
         <a:defRPr sz="1800" b="0" i="0" kern="1200">
           <a:solidFill>
@@ -6108,7 +6100,7 @@
           <a:schemeClr val="accent1"/>
         </a:buClr>
         <a:buSzPct val="80000"/>
-        <a:buFont typeface="Wingdings 3" charset="2"/>
+        <a:buFont typeface="Wingdings 3" panose="05040102010807070707" charset="2"/>
         <a:buChar char=""/>
         <a:defRPr sz="1600" b="0" i="0" kern="1200">
           <a:solidFill>
@@ -6130,7 +6122,7 @@
           <a:schemeClr val="accent1"/>
         </a:buClr>
         <a:buSzPct val="80000"/>
-        <a:buFont typeface="Wingdings 3" charset="2"/>
+        <a:buFont typeface="Wingdings 3" panose="05040102010807070707" charset="2"/>
         <a:buChar char=""/>
         <a:defRPr sz="1400" b="0" i="0" kern="1200">
           <a:solidFill>
@@ -6152,7 +6144,7 @@
           <a:schemeClr val="accent1"/>
         </a:buClr>
         <a:buSzPct val="80000"/>
-        <a:buFont typeface="Wingdings 3" charset="2"/>
+        <a:buFont typeface="Wingdings 3" panose="05040102010807070707" charset="2"/>
         <a:buChar char=""/>
         <a:defRPr sz="1400" b="0" i="0" kern="1200">
           <a:solidFill>
@@ -6174,7 +6166,7 @@
           <a:schemeClr val="accent1"/>
         </a:buClr>
         <a:buSzPct val="80000"/>
-        <a:buFont typeface="Wingdings 3" charset="2"/>
+        <a:buFont typeface="Wingdings 3" panose="05040102010807070707" charset="2"/>
         <a:buChar char=""/>
         <a:defRPr sz="1400" b="0" i="0" kern="1200">
           <a:solidFill>
@@ -6196,7 +6188,7 @@
           <a:schemeClr val="accent1"/>
         </a:buClr>
         <a:buSzPct val="80000"/>
-        <a:buFont typeface="Wingdings 3" charset="2"/>
+        <a:buFont typeface="Wingdings 3" panose="05040102010807070707" charset="2"/>
         <a:buChar char=""/>
         <a:defRPr sz="1400" b="0" i="0" kern="1200">
           <a:solidFill>
@@ -6218,7 +6210,7 @@
           <a:schemeClr val="accent1"/>
         </a:buClr>
         <a:buSzPct val="80000"/>
-        <a:buFont typeface="Wingdings 3" charset="2"/>
+        <a:buFont typeface="Wingdings 3" panose="05040102010807070707" charset="2"/>
         <a:buChar char=""/>
         <a:defRPr sz="1400" b="0" i="0" kern="1200">
           <a:solidFill>
@@ -6240,7 +6232,7 @@
           <a:schemeClr val="accent1"/>
         </a:buClr>
         <a:buSzPct val="80000"/>
-        <a:buFont typeface="Wingdings 3" charset="2"/>
+        <a:buFont typeface="Wingdings 3" panose="05040102010807070707" charset="2"/>
         <a:buChar char=""/>
         <a:defRPr sz="1400" b="0" i="0" kern="1200">
           <a:solidFill>
@@ -6370,13 +6362,7 @@
       </p:grpSpPr>
       <p:sp>
         <p:nvSpPr>
-          <p:cNvPr id="2" name="Titolo 1">
-            <a:extLst>
-              <a:ext uri="{FF2B5EF4-FFF2-40B4-BE49-F238E27FC236}">
-                <a16:creationId xmlns:a16="http://schemas.microsoft.com/office/drawing/2014/main" id="{99A76304-7514-42AE-B017-21AC7832F0AC}"/>
-              </a:ext>
-            </a:extLst>
-          </p:cNvPr>
+          <p:cNvPr id="2" name="Titolo 1"/>
           <p:cNvSpPr>
             <a:spLocks noGrp="1"/>
           </p:cNvSpPr>
@@ -6416,13 +6402,7 @@
       </p:sp>
       <p:sp>
         <p:nvSpPr>
-          <p:cNvPr id="3" name="Sottotitolo 2">
-            <a:extLst>
-              <a:ext uri="{FF2B5EF4-FFF2-40B4-BE49-F238E27FC236}">
-                <a16:creationId xmlns:a16="http://schemas.microsoft.com/office/drawing/2014/main" id="{F332EE8B-6396-4F1F-B868-60A7512D9683}"/>
-              </a:ext>
-            </a:extLst>
-          </p:cNvPr>
+          <p:cNvPr id="3" name="Sottotitolo 2"/>
           <p:cNvSpPr>
             <a:spLocks noGrp="1"/>
           </p:cNvSpPr>
@@ -6501,11 +6481,69 @@
         </p:txBody>
       </p:sp>
     </p:spTree>
-    <p:extLst>
-      <p:ext uri="{BB962C8B-B14F-4D97-AF65-F5344CB8AC3E}">
-        <p14:creationId xmlns:p14="http://schemas.microsoft.com/office/powerpoint/2010/main" val="1877805860"/>
-      </p:ext>
-    </p:extLst>
+  </p:cSld>
+  <p:clrMapOvr>
+    <a:masterClrMapping/>
+  </p:clrMapOvr>
+</p:sld>
+</file>
+
+<file path=ppt/slides/slide10.xml><?xml version="1.0" encoding="utf-8"?>
+<p:sld xmlns:a="http://schemas.openxmlformats.org/drawingml/2006/main" xmlns:r="http://schemas.openxmlformats.org/officeDocument/2006/relationships" xmlns:p="http://schemas.openxmlformats.org/presentationml/2006/main">
+  <p:cSld>
+    <p:spTree>
+      <p:nvGrpSpPr>
+        <p:cNvPr id="1" name=""/>
+        <p:cNvGrpSpPr/>
+        <p:nvPr/>
+      </p:nvGrpSpPr>
+      <p:grpSpPr>
+        <a:xfrm>
+          <a:off x="0" y="0"/>
+          <a:ext cx="0" cy="0"/>
+          <a:chOff x="0" y="0"/>
+          <a:chExt cx="0" cy="0"/>
+        </a:xfrm>
+      </p:grpSpPr>
+      <p:sp>
+        <p:nvSpPr>
+          <p:cNvPr id="2" name="Titolo 1"/>
+          <p:cNvSpPr>
+            <a:spLocks noGrp="1"/>
+          </p:cNvSpPr>
+          <p:nvPr>
+            <p:ph type="title"/>
+          </p:nvPr>
+        </p:nvSpPr>
+        <p:spPr/>
+        <p:txBody>
+          <a:bodyPr/>
+          <a:lstStyle/>
+          <a:p>
+            <a:endParaRPr lang="fr-FR"/>
+          </a:p>
+        </p:txBody>
+      </p:sp>
+      <p:sp>
+        <p:nvSpPr>
+          <p:cNvPr id="3" name="Segnaposto contenuto 2"/>
+          <p:cNvSpPr>
+            <a:spLocks noGrp="1"/>
+          </p:cNvSpPr>
+          <p:nvPr>
+            <p:ph idx="1"/>
+          </p:nvPr>
+        </p:nvSpPr>
+        <p:spPr/>
+        <p:txBody>
+          <a:bodyPr/>
+          <a:lstStyle/>
+          <a:p>
+            <a:endParaRPr lang="fr-FR"/>
+          </a:p>
+        </p:txBody>
+      </p:sp>
+    </p:spTree>
   </p:cSld>
   <p:clrMapOvr>
     <a:masterClrMapping/>
@@ -6532,13 +6570,7 @@
       </p:grpSpPr>
       <p:sp>
         <p:nvSpPr>
-          <p:cNvPr id="2" name="Titolo 1">
-            <a:extLst>
-              <a:ext uri="{FF2B5EF4-FFF2-40B4-BE49-F238E27FC236}">
-                <a16:creationId xmlns:a16="http://schemas.microsoft.com/office/drawing/2014/main" id="{E3B9193F-9DBA-4E55-A965-22872E567C36}"/>
-              </a:ext>
-            </a:extLst>
-          </p:cNvPr>
+          <p:cNvPr id="2" name="Titolo 1"/>
           <p:cNvSpPr>
             <a:spLocks noGrp="1"/>
           </p:cNvSpPr>
@@ -6594,13 +6626,7 @@
       </p:sp>
       <p:sp>
         <p:nvSpPr>
-          <p:cNvPr id="3" name="Segnaposto contenuto 2">
-            <a:extLst>
-              <a:ext uri="{FF2B5EF4-FFF2-40B4-BE49-F238E27FC236}">
-                <a16:creationId xmlns:a16="http://schemas.microsoft.com/office/drawing/2014/main" id="{FFDB073D-F6E7-49F7-BB67-23B0BB006133}"/>
-              </a:ext>
-            </a:extLst>
-          </p:cNvPr>
+          <p:cNvPr id="3" name="Segnaposto contenuto 2"/>
           <p:cNvSpPr>
             <a:spLocks noGrp="1"/>
           </p:cNvSpPr>
@@ -6618,11 +6644,6 @@
         </p:txBody>
       </p:sp>
     </p:spTree>
-    <p:extLst>
-      <p:ext uri="{BB962C8B-B14F-4D97-AF65-F5344CB8AC3E}">
-        <p14:creationId xmlns:p14="http://schemas.microsoft.com/office/powerpoint/2010/main" val="3039136363"/>
-      </p:ext>
-    </p:extLst>
   </p:cSld>
   <p:clrMapOvr>
     <a:masterClrMapping/>
@@ -6649,13 +6670,7 @@
       </p:grpSpPr>
       <p:sp>
         <p:nvSpPr>
-          <p:cNvPr id="2" name="Titolo 1">
-            <a:extLst>
-              <a:ext uri="{FF2B5EF4-FFF2-40B4-BE49-F238E27FC236}">
-                <a16:creationId xmlns:a16="http://schemas.microsoft.com/office/drawing/2014/main" id="{7246E84D-E70C-4F89-9D2C-9AB53566CB40}"/>
-              </a:ext>
-            </a:extLst>
-          </p:cNvPr>
+          <p:cNvPr id="2" name="Titolo 1"/>
           <p:cNvSpPr>
             <a:spLocks noGrp="1"/>
           </p:cNvSpPr>
@@ -6690,29 +6705,26 @@
         <p:nvPicPr>
           <p:cNvPr id="4" name="T2_animation">
             <a:hlinkClick r:id="" action="ppaction://media"/>
-            <a:extLst>
-              <a:ext uri="{FF2B5EF4-FFF2-40B4-BE49-F238E27FC236}">
-                <a16:creationId xmlns:a16="http://schemas.microsoft.com/office/drawing/2014/main" id="{7C653B6F-2F72-4851-AE04-AB32BE43DFD2}"/>
-              </a:ext>
-            </a:extLst>
           </p:cNvPr>
           <p:cNvPicPr>
             <a:picLocks noGrp="1" noChangeAspect="1"/>
           </p:cNvPicPr>
           <p:nvPr>
             <p:ph idx="1"/>
-            <a:videoFile r:link="rId2"/>
+            <a:videoFile r:link="rId1"/>
             <p:extLst>
               <p:ext uri="{DAA4B4D4-6D71-4841-9C94-3DE7FCFB9230}">
-                <p14:media xmlns:p14="http://schemas.microsoft.com/office/powerpoint/2010/main" r:embed="rId1"/>
+                <p14:media xmlns:p14="http://schemas.microsoft.com/office/powerpoint/2010/main" r:embed="rId2"/>
               </p:ext>
             </p:extLst>
           </p:nvPr>
         </p:nvPicPr>
         <p:blipFill rotWithShape="1">
-          <a:blip r:embed="rId4"/>
+          <a:blip r:embed="rId3"/>
           <a:srcRect l="13376" r="9666" b="11260"/>
-          <a:stretch/>
+          <a:stretch>
+            <a:fillRect/>
+          </a:stretch>
         </p:blipFill>
         <p:spPr>
           <a:xfrm>
@@ -6723,20 +6735,14 @@
       </p:pic>
       <p:pic>
         <p:nvPicPr>
-          <p:cNvPr id="7" name="Immagine 6">
-            <a:extLst>
-              <a:ext uri="{FF2B5EF4-FFF2-40B4-BE49-F238E27FC236}">
-                <a16:creationId xmlns:a16="http://schemas.microsoft.com/office/drawing/2014/main" id="{70185D71-499B-472A-A719-BE59773E8155}"/>
-              </a:ext>
-            </a:extLst>
-          </p:cNvPr>
+          <p:cNvPr id="7" name="Immagine 6"/>
           <p:cNvPicPr>
             <a:picLocks noChangeAspect="1"/>
           </p:cNvPicPr>
           <p:nvPr/>
         </p:nvPicPr>
         <p:blipFill>
-          <a:blip r:embed="rId5"/>
+          <a:blip r:embed="rId4"/>
           <a:stretch>
             <a:fillRect/>
           </a:stretch>
@@ -6752,11 +6758,6 @@
         </p:spPr>
       </p:pic>
     </p:spTree>
-    <p:extLst>
-      <p:ext uri="{BB962C8B-B14F-4D97-AF65-F5344CB8AC3E}">
-        <p14:creationId xmlns:p14="http://schemas.microsoft.com/office/powerpoint/2010/main" val="1176440896"/>
-      </p:ext>
-    </p:extLst>
   </p:cSld>
   <p:clrMapOvr>
     <a:masterClrMapping/>
@@ -6918,13 +6919,7 @@
       </p:grpSpPr>
       <p:sp>
         <p:nvSpPr>
-          <p:cNvPr id="2" name="Titolo 1">
-            <a:extLst>
-              <a:ext uri="{FF2B5EF4-FFF2-40B4-BE49-F238E27FC236}">
-                <a16:creationId xmlns:a16="http://schemas.microsoft.com/office/drawing/2014/main" id="{95DE52A3-8EBF-405F-89D5-B7DF1DFBEA20}"/>
-              </a:ext>
-            </a:extLst>
-          </p:cNvPr>
+          <p:cNvPr id="2" name="Titolo 1"/>
           <p:cNvSpPr>
             <a:spLocks noGrp="1"/>
           </p:cNvSpPr>
@@ -6965,20 +6960,14 @@
       </p:sp>
       <p:pic>
         <p:nvPicPr>
-          <p:cNvPr id="4" name="Immagine 3">
-            <a:extLst>
-              <a:ext uri="{FF2B5EF4-FFF2-40B4-BE49-F238E27FC236}">
-                <a16:creationId xmlns:a16="http://schemas.microsoft.com/office/drawing/2014/main" id="{B5EF61ED-3A78-4A0F-85C7-EA9EAA8EDEC3}"/>
-              </a:ext>
-            </a:extLst>
-          </p:cNvPr>
+          <p:cNvPr id="4" name="Immagine 3"/>
           <p:cNvPicPr>
             <a:picLocks noChangeAspect="1"/>
           </p:cNvPicPr>
           <p:nvPr/>
         </p:nvPicPr>
         <p:blipFill>
-          <a:blip r:embed="rId2"/>
+          <a:blip r:embed="rId1"/>
           <a:stretch>
             <a:fillRect/>
           </a:stretch>
@@ -6995,20 +6984,14 @@
       </p:pic>
       <p:pic>
         <p:nvPicPr>
-          <p:cNvPr id="5" name="Immagine 4">
-            <a:extLst>
-              <a:ext uri="{FF2B5EF4-FFF2-40B4-BE49-F238E27FC236}">
-                <a16:creationId xmlns:a16="http://schemas.microsoft.com/office/drawing/2014/main" id="{E6ACC8E6-88B4-4B4C-9313-2F1CF059AAEE}"/>
-              </a:ext>
-            </a:extLst>
-          </p:cNvPr>
+          <p:cNvPr id="5" name="Immagine 4"/>
           <p:cNvPicPr>
             <a:picLocks noChangeAspect="1"/>
           </p:cNvPicPr>
           <p:nvPr/>
         </p:nvPicPr>
         <p:blipFill>
-          <a:blip r:embed="rId3"/>
+          <a:blip r:embed="rId2"/>
           <a:stretch>
             <a:fillRect/>
           </a:stretch>
@@ -7025,13 +7008,7 @@
       </p:pic>
       <p:sp>
         <p:nvSpPr>
-          <p:cNvPr id="8" name="CasellaDiTesto 7">
-            <a:extLst>
-              <a:ext uri="{FF2B5EF4-FFF2-40B4-BE49-F238E27FC236}">
-                <a16:creationId xmlns:a16="http://schemas.microsoft.com/office/drawing/2014/main" id="{25E35C15-1122-4FAD-8F60-E295CB5F34D1}"/>
-              </a:ext>
-            </a:extLst>
-          </p:cNvPr>
+          <p:cNvPr id="8" name="CasellaDiTesto 7"/>
           <p:cNvSpPr txBox="1"/>
           <p:nvPr/>
         </p:nvSpPr>
@@ -7052,7 +7029,7 @@
           <a:lstStyle/>
           <a:p>
             <a:pPr marL="285750" indent="-285750">
-              <a:buFont typeface="Arial" panose="020B0604020202020204" pitchFamily="34" charset="0"/>
+              <a:buFont typeface="Arial" panose="020B0704020202020204" pitchFamily="34" charset="0"/>
               <a:buChar char="•"/>
             </a:pPr>
             <a:r>
@@ -7063,7 +7040,7 @@
           </a:p>
           <a:p>
             <a:pPr marL="285750" indent="-285750">
-              <a:buFont typeface="Arial" panose="020B0604020202020204" pitchFamily="34" charset="0"/>
+              <a:buFont typeface="Arial" panose="020B0704020202020204" pitchFamily="34" charset="0"/>
               <a:buChar char="•"/>
             </a:pPr>
             <a:r>
@@ -7078,7 +7055,7 @@
           </a:p>
           <a:p>
             <a:pPr marL="285750" indent="-285750">
-              <a:buFont typeface="Arial" panose="020B0604020202020204" pitchFamily="34" charset="0"/>
+              <a:buFont typeface="Arial" panose="020B0704020202020204" pitchFamily="34" charset="0"/>
               <a:buChar char="•"/>
             </a:pPr>
             <a:r>
@@ -7107,20 +7084,14 @@
       </p:sp>
       <p:pic>
         <p:nvPicPr>
-          <p:cNvPr id="9" name="Immagine 8">
-            <a:extLst>
-              <a:ext uri="{FF2B5EF4-FFF2-40B4-BE49-F238E27FC236}">
-                <a16:creationId xmlns:a16="http://schemas.microsoft.com/office/drawing/2014/main" id="{7F1B8875-A6DB-4C66-A97D-19FF03F6DEC6}"/>
-              </a:ext>
-            </a:extLst>
-          </p:cNvPr>
+          <p:cNvPr id="9" name="Immagine 8"/>
           <p:cNvPicPr>
             <a:picLocks noChangeAspect="1"/>
           </p:cNvPicPr>
           <p:nvPr/>
         </p:nvPicPr>
         <p:blipFill>
-          <a:blip r:embed="rId4"/>
+          <a:blip r:embed="rId3"/>
           <a:stretch>
             <a:fillRect/>
           </a:stretch>
@@ -7137,20 +7108,14 @@
       </p:pic>
       <p:pic>
         <p:nvPicPr>
-          <p:cNvPr id="11" name="Immagine 10">
-            <a:extLst>
-              <a:ext uri="{FF2B5EF4-FFF2-40B4-BE49-F238E27FC236}">
-                <a16:creationId xmlns:a16="http://schemas.microsoft.com/office/drawing/2014/main" id="{31A814D5-0D14-448B-8FFB-09A576EF0644}"/>
-              </a:ext>
-            </a:extLst>
-          </p:cNvPr>
+          <p:cNvPr id="11" name="Immagine 10"/>
           <p:cNvPicPr>
             <a:picLocks noChangeAspect="1"/>
           </p:cNvPicPr>
           <p:nvPr/>
         </p:nvPicPr>
         <p:blipFill>
-          <a:blip r:embed="rId5"/>
+          <a:blip r:embed="rId4"/>
           <a:stretch>
             <a:fillRect/>
           </a:stretch>
@@ -7166,11 +7131,6 @@
         </p:spPr>
       </p:pic>
     </p:spTree>
-    <p:extLst>
-      <p:ext uri="{BB962C8B-B14F-4D97-AF65-F5344CB8AC3E}">
-        <p14:creationId xmlns:p14="http://schemas.microsoft.com/office/powerpoint/2010/main" val="2847750587"/>
-      </p:ext>
-    </p:extLst>
   </p:cSld>
   <p:clrMapOvr>
     <a:masterClrMapping/>
@@ -7197,13 +7157,7 @@
       </p:grpSpPr>
       <p:sp>
         <p:nvSpPr>
-          <p:cNvPr id="2" name="Titolo 1">
-            <a:extLst>
-              <a:ext uri="{FF2B5EF4-FFF2-40B4-BE49-F238E27FC236}">
-                <a16:creationId xmlns:a16="http://schemas.microsoft.com/office/drawing/2014/main" id="{B61C2A55-2AA6-476C-8AC2-5380EFD83958}"/>
-              </a:ext>
-            </a:extLst>
-          </p:cNvPr>
+          <p:cNvPr id="2" name="Titolo 1"/>
           <p:cNvSpPr>
             <a:spLocks noGrp="1"/>
           </p:cNvSpPr>
@@ -7232,23 +7186,11 @@
       </p:sp>
       <p:graphicFrame>
         <p:nvGraphicFramePr>
-          <p:cNvPr id="4" name="Tabella 3">
-            <a:extLst>
-              <a:ext uri="{FF2B5EF4-FFF2-40B4-BE49-F238E27FC236}">
-                <a16:creationId xmlns:a16="http://schemas.microsoft.com/office/drawing/2014/main" id="{AD5D2C7B-B10D-46BB-A937-83CBF807B499}"/>
-              </a:ext>
-            </a:extLst>
-          </p:cNvPr>
+          <p:cNvPr id="4" name="Tabella 3"/>
           <p:cNvGraphicFramePr>
             <a:graphicFrameLocks noGrp="1"/>
           </p:cNvGraphicFramePr>
-          <p:nvPr>
-            <p:extLst>
-              <p:ext uri="{D42A27DB-BD31-4B8C-83A1-F6EECF244321}">
-                <p14:modId xmlns:p14="http://schemas.microsoft.com/office/powerpoint/2010/main" val="3761599972"/>
-              </p:ext>
-            </p:extLst>
-          </p:nvPr>
+          <p:nvPr/>
         </p:nvGraphicFramePr>
         <p:xfrm>
           <a:off x="236220" y="1359746"/>
@@ -7261,34 +7203,10 @@
                 <a:tableStyleId>{00A15C55-8517-42AA-B614-E9B94910E393}</a:tableStyleId>
               </a:tblPr>
               <a:tblGrid>
-                <a:gridCol w="2491740">
-                  <a:extLst>
-                    <a:ext uri="{9D8B030D-6E8A-4147-A177-3AD203B41FA5}">
-                      <a16:colId xmlns:a16="http://schemas.microsoft.com/office/drawing/2014/main" val="620185256"/>
-                    </a:ext>
-                  </a:extLst>
-                </a:gridCol>
-                <a:gridCol w="1066800">
-                  <a:extLst>
-                    <a:ext uri="{9D8B030D-6E8A-4147-A177-3AD203B41FA5}">
-                      <a16:colId xmlns:a16="http://schemas.microsoft.com/office/drawing/2014/main" val="766196048"/>
-                    </a:ext>
-                  </a:extLst>
-                </a:gridCol>
-                <a:gridCol w="2148840">
-                  <a:extLst>
-                    <a:ext uri="{9D8B030D-6E8A-4147-A177-3AD203B41FA5}">
-                      <a16:colId xmlns:a16="http://schemas.microsoft.com/office/drawing/2014/main" val="206678755"/>
-                    </a:ext>
-                  </a:extLst>
-                </a:gridCol>
-                <a:gridCol w="1043940">
-                  <a:extLst>
-                    <a:ext uri="{9D8B030D-6E8A-4147-A177-3AD203B41FA5}">
-                      <a16:colId xmlns:a16="http://schemas.microsoft.com/office/drawing/2014/main" val="3057354225"/>
-                    </a:ext>
-                  </a:extLst>
-                </a:gridCol>
+                <a:gridCol w="2491740"/>
+                <a:gridCol w="1066800"/>
+                <a:gridCol w="2148840"/>
+                <a:gridCol w="1043940"/>
               </a:tblGrid>
               <a:tr h="370840">
                 <a:tc>
@@ -7330,6 +7248,7 @@
                         <a:rPr lang="it-IT" dirty="0"/>
                         <a:t>COMPUTATIONAL TIME</a:t>
                       </a:r>
+                      <a:endParaRPr lang="it-IT" dirty="0"/>
                     </a:p>
                   </a:txBody>
                   <a:tcPr/>
@@ -7348,11 +7267,6 @@
                   </a:txBody>
                   <a:tcPr/>
                 </a:tc>
-                <a:extLst>
-                  <a:ext uri="{0D108BD9-81ED-4DB2-BD59-A6C34878D82A}">
-                    <a16:rowId xmlns:a16="http://schemas.microsoft.com/office/drawing/2014/main" val="1207458813"/>
-                  </a:ext>
-                </a:extLst>
               </a:tr>
               <a:tr h="370840">
                 <a:tc>
@@ -7399,11 +7313,6 @@
                   </a:txBody>
                   <a:tcPr/>
                 </a:tc>
-                <a:extLst>
-                  <a:ext uri="{0D108BD9-81ED-4DB2-BD59-A6C34878D82A}">
-                    <a16:rowId xmlns:a16="http://schemas.microsoft.com/office/drawing/2014/main" val="3344394773"/>
-                  </a:ext>
-                </a:extLst>
               </a:tr>
               <a:tr h="370840">
                 <a:tc>
@@ -7454,11 +7363,6 @@
                   </a:txBody>
                   <a:tcPr/>
                 </a:tc>
-                <a:extLst>
-                  <a:ext uri="{0D108BD9-81ED-4DB2-BD59-A6C34878D82A}">
-                    <a16:rowId xmlns:a16="http://schemas.microsoft.com/office/drawing/2014/main" val="1337811652"/>
-                  </a:ext>
-                </a:extLst>
               </a:tr>
               <a:tr h="370840">
                 <a:tc>
@@ -7509,11 +7413,6 @@
                   </a:txBody>
                   <a:tcPr/>
                 </a:tc>
-                <a:extLst>
-                  <a:ext uri="{0D108BD9-81ED-4DB2-BD59-A6C34878D82A}">
-                    <a16:rowId xmlns:a16="http://schemas.microsoft.com/office/drawing/2014/main" val="28448844"/>
-                  </a:ext>
-                </a:extLst>
               </a:tr>
               <a:tr h="370840">
                 <a:tc>
@@ -7564,11 +7463,6 @@
                   </a:txBody>
                   <a:tcPr/>
                 </a:tc>
-                <a:extLst>
-                  <a:ext uri="{0D108BD9-81ED-4DB2-BD59-A6C34878D82A}">
-                    <a16:rowId xmlns:a16="http://schemas.microsoft.com/office/drawing/2014/main" val="2066874266"/>
-                  </a:ext>
-                </a:extLst>
               </a:tr>
               <a:tr h="370840">
                 <a:tc>
@@ -7619,11 +7513,6 @@
                   </a:txBody>
                   <a:tcPr/>
                 </a:tc>
-                <a:extLst>
-                  <a:ext uri="{0D108BD9-81ED-4DB2-BD59-A6C34878D82A}">
-                    <a16:rowId xmlns:a16="http://schemas.microsoft.com/office/drawing/2014/main" val="3140980695"/>
-                  </a:ext>
-                </a:extLst>
               </a:tr>
             </a:tbl>
           </a:graphicData>
@@ -7631,13 +7520,7 @@
       </p:graphicFrame>
       <p:sp>
         <p:nvSpPr>
-          <p:cNvPr id="5" name="CasellaDiTesto 4">
-            <a:extLst>
-              <a:ext uri="{FF2B5EF4-FFF2-40B4-BE49-F238E27FC236}">
-                <a16:creationId xmlns:a16="http://schemas.microsoft.com/office/drawing/2014/main" id="{AB987B52-CB3F-46E2-98E7-03DD3617DCEB}"/>
-              </a:ext>
-            </a:extLst>
-          </p:cNvPr>
+          <p:cNvPr id="5" name="CasellaDiTesto 4"/>
           <p:cNvSpPr txBox="1"/>
           <p:nvPr/>
         </p:nvSpPr>
@@ -7670,11 +7553,6 @@
         </p:txBody>
       </p:sp>
     </p:spTree>
-    <p:extLst>
-      <p:ext uri="{BB962C8B-B14F-4D97-AF65-F5344CB8AC3E}">
-        <p14:creationId xmlns:p14="http://schemas.microsoft.com/office/powerpoint/2010/main" val="4054810209"/>
-      </p:ext>
-    </p:extLst>
   </p:cSld>
   <p:clrMapOvr>
     <a:masterClrMapping/>
@@ -7701,13 +7579,7 @@
       </p:grpSpPr>
       <p:sp>
         <p:nvSpPr>
-          <p:cNvPr id="2" name="Titolo 1">
-            <a:extLst>
-              <a:ext uri="{FF2B5EF4-FFF2-40B4-BE49-F238E27FC236}">
-                <a16:creationId xmlns:a16="http://schemas.microsoft.com/office/drawing/2014/main" id="{0C2154DA-BA16-432C-872A-7145EBFDA57C}"/>
-              </a:ext>
-            </a:extLst>
-          </p:cNvPr>
+          <p:cNvPr id="2" name="Titolo 1"/>
           <p:cNvSpPr>
             <a:spLocks noGrp="1"/>
           </p:cNvSpPr>
@@ -7744,13 +7616,7 @@
       </p:sp>
       <p:sp>
         <p:nvSpPr>
-          <p:cNvPr id="4" name="CasellaDiTesto 3">
-            <a:extLst>
-              <a:ext uri="{FF2B5EF4-FFF2-40B4-BE49-F238E27FC236}">
-                <a16:creationId xmlns:a16="http://schemas.microsoft.com/office/drawing/2014/main" id="{59A07685-BD18-4366-8532-355599D05DFC}"/>
-              </a:ext>
-            </a:extLst>
-          </p:cNvPr>
+          <p:cNvPr id="4" name="CasellaDiTesto 3"/>
           <p:cNvSpPr txBox="1"/>
           <p:nvPr/>
         </p:nvSpPr>
@@ -7771,7 +7637,7 @@
           <a:lstStyle/>
           <a:p>
             <a:pPr marL="285750" indent="-285750">
-              <a:buFont typeface="Arial" panose="020B0604020202020204" pitchFamily="34" charset="0"/>
+              <a:buFont typeface="Arial" panose="020B0704020202020204" pitchFamily="34" charset="0"/>
               <a:buChar char="•"/>
             </a:pPr>
             <a:r>
@@ -7786,13 +7652,7 @@
         <mc:Choice xmlns:a14="http://schemas.microsoft.com/office/drawing/2010/main" Requires="a14">
           <p:sp>
             <p:nvSpPr>
-              <p:cNvPr id="5" name="CasellaDiTesto 4">
-                <a:extLst>
-                  <a:ext uri="{FF2B5EF4-FFF2-40B4-BE49-F238E27FC236}">
-                    <a16:creationId xmlns:a16="http://schemas.microsoft.com/office/drawing/2014/main" id="{5F8C94D1-C7EC-4FDD-A28E-EF6B133D4930}"/>
-                  </a:ext>
-                </a:extLst>
-              </p:cNvPr>
+              <p:cNvPr id="5" name="CasellaDiTesto 4"/>
               <p:cNvSpPr txBox="1"/>
               <p:nvPr/>
             </p:nvSpPr>
@@ -8021,7 +7881,13 @@
                                 <a:rPr lang="fr-FR" i="1">
                                   <a:latin typeface="Cambria Math" panose="02040503050406030204" pitchFamily="18" charset="0"/>
                                 </a:rPr>
-                                <m:t>1 − </m:t>
+                                <m:t>1</m:t>
+                              </m:r>
+                              <m:r>
+                                <a:rPr lang="fr-FR" i="1">
+                                  <a:latin typeface="Cambria Math" panose="02040503050406030204" pitchFamily="18" charset="0"/>
+                                </a:rPr>
+                                <m:t> − </m:t>
                               </m:r>
                               <m:sSub>
                                 <m:sSubPr>
@@ -8157,13 +8023,7 @@
         <mc:Fallback>
           <p:sp>
             <p:nvSpPr>
-              <p:cNvPr id="5" name="CasellaDiTesto 4">
-                <a:extLst>
-                  <a:ext uri="{FF2B5EF4-FFF2-40B4-BE49-F238E27FC236}">
-                    <a16:creationId xmlns:a16="http://schemas.microsoft.com/office/drawing/2014/main" id="{5F8C94D1-C7EC-4FDD-A28E-EF6B133D4930}"/>
-                  </a:ext>
-                </a:extLst>
-              </p:cNvPr>
+              <p:cNvPr id="5" name="CasellaDiTesto 4"/>
               <p:cNvSpPr txBox="1">
                 <a:spLocks noRot="1" noChangeAspect="1" noMove="1" noResize="1" noEditPoints="1" noAdjustHandles="1" noChangeArrowheads="1" noChangeShapeType="1" noTextEdit="1"/>
               </p:cNvSpPr>
@@ -8177,10 +8037,10 @@
               <a:prstGeom prst="rect">
                 <a:avLst/>
               </a:prstGeom>
-              <a:blipFill>
-                <a:blip r:embed="rId2"/>
+              <a:blipFill rotWithShape="1">
+                <a:blip r:embed="rId1"/>
                 <a:stretch>
-                  <a:fillRect/>
+                  <a:fillRect t="-83" r="-3562" b="-25108"/>
                 </a:stretch>
               </a:blipFill>
             </p:spPr>
@@ -8189,7 +8049,7 @@
               <a:lstStyle/>
               <a:p>
                 <a:r>
-                  <a:rPr lang="fr-FR">
+                  <a:rPr lang="zh-CN" altLang="en-US">
                     <a:noFill/>
                   </a:rPr>
                   <a:t> </a:t>
@@ -8201,13 +8061,7 @@
       </mc:AlternateContent>
       <p:sp>
         <p:nvSpPr>
-          <p:cNvPr id="10" name="Freccia a destra 9">
-            <a:extLst>
-              <a:ext uri="{FF2B5EF4-FFF2-40B4-BE49-F238E27FC236}">
-                <a16:creationId xmlns:a16="http://schemas.microsoft.com/office/drawing/2014/main" id="{649F41F4-6705-40B2-8820-757AB7F6D9F3}"/>
-              </a:ext>
-            </a:extLst>
-          </p:cNvPr>
+          <p:cNvPr id="10" name="Freccia a destra 9"/>
           <p:cNvSpPr/>
           <p:nvPr/>
         </p:nvSpPr>
@@ -8246,25 +8100,50 @@
           </a:p>
         </p:txBody>
       </p:sp>
+      <p:sp>
+        <p:nvSpPr>
+          <p:cNvPr id="13" name="CasellaDiTesto 12"/>
+          <p:cNvSpPr txBox="1"/>
+          <p:nvPr/>
+        </p:nvSpPr>
+        <p:spPr>
+          <a:xfrm>
+            <a:off x="8077200" y="1846816"/>
+            <a:ext cx="3870960" cy="646331"/>
+          </a:xfrm>
+          <a:prstGeom prst="rect">
+            <a:avLst/>
+          </a:prstGeom>
+          <a:noFill/>
+        </p:spPr>
+        <p:txBody>
+          <a:bodyPr wrap="square" rtlCol="0">
+            <a:spAutoFit/>
+          </a:bodyPr>
+          <a:lstStyle/>
+          <a:p>
+            <a:r>
+              <a:rPr lang="it-IT" dirty="0"/>
+              <a:t>Here T2 and v </a:t>
+            </a:r>
+            <a:r>
+              <a:rPr lang="it-IT" dirty="0" err="1"/>
+              <a:t>maps</a:t>
+            </a:r>
+            <a:endParaRPr lang="it-IT" dirty="0"/>
+          </a:p>
+          <a:p>
+            <a:endParaRPr lang="fr-FR" dirty="0"/>
+          </a:p>
+        </p:txBody>
+      </p:sp>
       <p:graphicFrame>
         <p:nvGraphicFramePr>
-          <p:cNvPr id="12" name="Tabella 11">
-            <a:extLst>
-              <a:ext uri="{FF2B5EF4-FFF2-40B4-BE49-F238E27FC236}">
-                <a16:creationId xmlns:a16="http://schemas.microsoft.com/office/drawing/2014/main" id="{DF1167C6-044F-451A-8881-343DFFDB2EF0}"/>
-              </a:ext>
-            </a:extLst>
-          </p:cNvPr>
+          <p:cNvPr id="3" name="Tabella 11"/>
           <p:cNvGraphicFramePr>
             <a:graphicFrameLocks noGrp="1"/>
           </p:cNvGraphicFramePr>
-          <p:nvPr>
-            <p:extLst>
-              <p:ext uri="{D42A27DB-BD31-4B8C-83A1-F6EECF244321}">
-                <p14:modId xmlns:p14="http://schemas.microsoft.com/office/powerpoint/2010/main" val="1999637936"/>
-              </p:ext>
-            </p:extLst>
-          </p:nvPr>
+          <p:nvPr/>
         </p:nvGraphicFramePr>
         <p:xfrm>
           <a:off x="645130" y="4587779"/>
@@ -8277,61 +8156,18 @@
                 <a:tableStyleId>{7DF18680-E054-41AD-8BC1-D1AEF772440D}</a:tableStyleId>
               </a:tblPr>
               <a:tblGrid>
-                <a:gridCol w="1457960">
-                  <a:extLst>
-                    <a:ext uri="{9D8B030D-6E8A-4147-A177-3AD203B41FA5}">
-                      <a16:colId xmlns:a16="http://schemas.microsoft.com/office/drawing/2014/main" val="682979362"/>
-                    </a:ext>
-                  </a:extLst>
-                </a:gridCol>
-                <a:gridCol w="1264920">
-                  <a:extLst>
-                    <a:ext uri="{9D8B030D-6E8A-4147-A177-3AD203B41FA5}">
-                      <a16:colId xmlns:a16="http://schemas.microsoft.com/office/drawing/2014/main" val="2929431097"/>
-                    </a:ext>
-                  </a:extLst>
-                </a:gridCol>
-                <a:gridCol w="1295400">
-                  <a:extLst>
-                    <a:ext uri="{9D8B030D-6E8A-4147-A177-3AD203B41FA5}">
-                      <a16:colId xmlns:a16="http://schemas.microsoft.com/office/drawing/2014/main" val="367734538"/>
-                    </a:ext>
-                  </a:extLst>
-                </a:gridCol>
-                <a:gridCol w="1280160">
-                  <a:extLst>
-                    <a:ext uri="{9D8B030D-6E8A-4147-A177-3AD203B41FA5}">
-                      <a16:colId xmlns:a16="http://schemas.microsoft.com/office/drawing/2014/main" val="584472974"/>
-                    </a:ext>
-                  </a:extLst>
-                </a:gridCol>
-                <a:gridCol w="1089660">
-                  <a:extLst>
-                    <a:ext uri="{9D8B030D-6E8A-4147-A177-3AD203B41FA5}">
-                      <a16:colId xmlns:a16="http://schemas.microsoft.com/office/drawing/2014/main" val="1686274969"/>
-                    </a:ext>
-                  </a:extLst>
-                </a:gridCol>
-                <a:gridCol w="1142498">
-                  <a:extLst>
-                    <a:ext uri="{9D8B030D-6E8A-4147-A177-3AD203B41FA5}">
-                      <a16:colId xmlns:a16="http://schemas.microsoft.com/office/drawing/2014/main" val="3296705224"/>
-                    </a:ext>
-                  </a:extLst>
-                </a:gridCol>
-                <a:gridCol w="891540">
-                  <a:extLst>
-                    <a:ext uri="{9D8B030D-6E8A-4147-A177-3AD203B41FA5}">
-                      <a16:colId xmlns:a16="http://schemas.microsoft.com/office/drawing/2014/main" val="4281057226"/>
-                    </a:ext>
-                  </a:extLst>
-                </a:gridCol>
+                <a:gridCol w="1457960"/>
+                <a:gridCol w="1264920"/>
+                <a:gridCol w="1295400"/>
+                <a:gridCol w="1280160"/>
+                <a:gridCol w="1089660"/>
+                <a:gridCol w="1142498"/>
+                <a:gridCol w="891540"/>
               </a:tblGrid>
               <a:tr h="259926">
                 <a:tc>
                   <a:txBody>
                     <a:bodyPr/>
-                    <a:lstStyle/>
                     <a:p>
                       <a:r>
                         <a:rPr lang="it-IT" dirty="0"/>
@@ -8345,7 +8181,6 @@
                 <a:tc>
                   <a:txBody>
                     <a:bodyPr/>
-                    <a:lstStyle/>
                     <a:p>
                       <a:r>
                         <a:rPr lang="it-IT" dirty="0"/>
@@ -8359,7 +8194,6 @@
                 <a:tc>
                   <a:txBody>
                     <a:bodyPr/>
-                    <a:lstStyle/>
                     <a:p>
                       <a:r>
                         <a:rPr lang="it-IT" dirty="0"/>
@@ -8373,7 +8207,6 @@
                 <a:tc>
                   <a:txBody>
                     <a:bodyPr/>
-                    <a:lstStyle/>
                     <a:p>
                       <a:r>
                         <a:rPr lang="it-IT" dirty="0"/>
@@ -8387,7 +8220,6 @@
                 <a:tc>
                   <a:txBody>
                     <a:bodyPr/>
-                    <a:lstStyle/>
                     <a:p>
                       <a:r>
                         <a:rPr lang="it-IT" dirty="0"/>
@@ -8401,7 +8233,6 @@
                 <a:tc>
                   <a:txBody>
                     <a:bodyPr/>
-                    <a:lstStyle/>
                     <a:p>
                       <a:r>
                         <a:rPr lang="it-IT" dirty="0"/>
@@ -8415,7 +8246,6 @@
                 <a:tc>
                   <a:txBody>
                     <a:bodyPr/>
-                    <a:lstStyle/>
                     <a:p>
                       <a:r>
                         <a:rPr lang="it-IT" dirty="0"/>
@@ -8426,17 +8256,11 @@
                   </a:txBody>
                   <a:tcPr/>
                 </a:tc>
-                <a:extLst>
-                  <a:ext uri="{0D108BD9-81ED-4DB2-BD59-A6C34878D82A}">
-                    <a16:rowId xmlns:a16="http://schemas.microsoft.com/office/drawing/2014/main" val="1492683566"/>
-                  </a:ext>
-                </a:extLst>
               </a:tr>
               <a:tr h="370840">
                 <a:tc>
                   <a:txBody>
                     <a:bodyPr/>
-                    <a:lstStyle/>
                     <a:p>
                       <a:r>
                         <a:rPr lang="it-IT" dirty="0"/>
@@ -8450,7 +8274,6 @@
                 <a:tc>
                   <a:txBody>
                     <a:bodyPr/>
-                    <a:lstStyle/>
                     <a:p>
                       <a:endParaRPr lang="fr-FR"/>
                     </a:p>
@@ -8460,7 +8283,6 @@
                 <a:tc>
                   <a:txBody>
                     <a:bodyPr/>
-                    <a:lstStyle/>
                     <a:p>
                       <a:endParaRPr lang="fr-FR" dirty="0"/>
                     </a:p>
@@ -8470,7 +8292,6 @@
                 <a:tc>
                   <a:txBody>
                     <a:bodyPr/>
-                    <a:lstStyle/>
                     <a:p>
                       <a:endParaRPr lang="fr-FR"/>
                     </a:p>
@@ -8480,7 +8301,6 @@
                 <a:tc>
                   <a:txBody>
                     <a:bodyPr/>
-                    <a:lstStyle/>
                     <a:p>
                       <a:endParaRPr lang="fr-FR"/>
                     </a:p>
@@ -8490,7 +8310,6 @@
                 <a:tc>
                   <a:txBody>
                     <a:bodyPr/>
-                    <a:lstStyle/>
                     <a:p>
                       <a:endParaRPr lang="fr-FR"/>
                     </a:p>
@@ -8500,24 +8319,17 @@
                 <a:tc>
                   <a:txBody>
                     <a:bodyPr/>
-                    <a:lstStyle/>
                     <a:p>
                       <a:endParaRPr lang="fr-FR"/>
                     </a:p>
                   </a:txBody>
                   <a:tcPr/>
                 </a:tc>
-                <a:extLst>
-                  <a:ext uri="{0D108BD9-81ED-4DB2-BD59-A6C34878D82A}">
-                    <a16:rowId xmlns:a16="http://schemas.microsoft.com/office/drawing/2014/main" val="3487410626"/>
-                  </a:ext>
-                </a:extLst>
               </a:tr>
               <a:tr h="370840">
                 <a:tc>
                   <a:txBody>
                     <a:bodyPr/>
-                    <a:lstStyle/>
                     <a:p>
                       <a:r>
                         <a:rPr lang="it-IT" dirty="0"/>
@@ -8531,7 +8343,6 @@
                 <a:tc>
                   <a:txBody>
                     <a:bodyPr/>
-                    <a:lstStyle/>
                     <a:p>
                       <a:endParaRPr lang="fr-FR"/>
                     </a:p>
@@ -8541,7 +8352,6 @@
                 <a:tc>
                   <a:txBody>
                     <a:bodyPr/>
-                    <a:lstStyle/>
                     <a:p>
                       <a:endParaRPr lang="fr-FR" dirty="0"/>
                     </a:p>
@@ -8551,7 +8361,6 @@
                 <a:tc>
                   <a:txBody>
                     <a:bodyPr/>
-                    <a:lstStyle/>
                     <a:p>
                       <a:endParaRPr lang="fr-FR"/>
                     </a:p>
@@ -8561,7 +8370,6 @@
                 <a:tc>
                   <a:txBody>
                     <a:bodyPr/>
-                    <a:lstStyle/>
                     <a:p>
                       <a:endParaRPr lang="fr-FR"/>
                     </a:p>
@@ -8571,7 +8379,6 @@
                 <a:tc>
                   <a:txBody>
                     <a:bodyPr/>
-                    <a:lstStyle/>
                     <a:p>
                       <a:endParaRPr lang="fr-FR"/>
                     </a:p>
@@ -8581,24 +8388,17 @@
                 <a:tc>
                   <a:txBody>
                     <a:bodyPr/>
-                    <a:lstStyle/>
                     <a:p>
                       <a:endParaRPr lang="fr-FR"/>
                     </a:p>
                   </a:txBody>
                   <a:tcPr/>
                 </a:tc>
-                <a:extLst>
-                  <a:ext uri="{0D108BD9-81ED-4DB2-BD59-A6C34878D82A}">
-                    <a16:rowId xmlns:a16="http://schemas.microsoft.com/office/drawing/2014/main" val="3262025574"/>
-                  </a:ext>
-                </a:extLst>
               </a:tr>
               <a:tr h="370840">
                 <a:tc>
                   <a:txBody>
                     <a:bodyPr/>
-                    <a:lstStyle/>
                     <a:p>
                       <a:r>
                         <a:rPr lang="it-IT" dirty="0"/>
@@ -8612,7 +8412,6 @@
                 <a:tc>
                   <a:txBody>
                     <a:bodyPr/>
-                    <a:lstStyle/>
                     <a:p>
                       <a:endParaRPr lang="fr-FR"/>
                     </a:p>
@@ -8622,7 +8421,6 @@
                 <a:tc>
                   <a:txBody>
                     <a:bodyPr/>
-                    <a:lstStyle/>
                     <a:p>
                       <a:endParaRPr lang="fr-FR" dirty="0"/>
                     </a:p>
@@ -8632,7 +8430,6 @@
                 <a:tc>
                   <a:txBody>
                     <a:bodyPr/>
-                    <a:lstStyle/>
                     <a:p>
                       <a:endParaRPr lang="fr-FR"/>
                     </a:p>
@@ -8642,7 +8439,6 @@
                 <a:tc>
                   <a:txBody>
                     <a:bodyPr/>
-                    <a:lstStyle/>
                     <a:p>
                       <a:endParaRPr lang="fr-FR"/>
                     </a:p>
@@ -8652,7 +8448,6 @@
                 <a:tc>
                   <a:txBody>
                     <a:bodyPr/>
-                    <a:lstStyle/>
                     <a:p>
                       <a:endParaRPr lang="fr-FR"/>
                     </a:p>
@@ -8662,72 +8457,18 @@
                 <a:tc>
                   <a:txBody>
                     <a:bodyPr/>
-                    <a:lstStyle/>
                     <a:p>
                       <a:endParaRPr lang="fr-FR" dirty="0"/>
                     </a:p>
                   </a:txBody>
                   <a:tcPr/>
                 </a:tc>
-                <a:extLst>
-                  <a:ext uri="{0D108BD9-81ED-4DB2-BD59-A6C34878D82A}">
-                    <a16:rowId xmlns:a16="http://schemas.microsoft.com/office/drawing/2014/main" val="3509009057"/>
-                  </a:ext>
-                </a:extLst>
               </a:tr>
             </a:tbl>
           </a:graphicData>
         </a:graphic>
       </p:graphicFrame>
-      <p:sp>
-        <p:nvSpPr>
-          <p:cNvPr id="13" name="CasellaDiTesto 12">
-            <a:extLst>
-              <a:ext uri="{FF2B5EF4-FFF2-40B4-BE49-F238E27FC236}">
-                <a16:creationId xmlns:a16="http://schemas.microsoft.com/office/drawing/2014/main" id="{0B11AD73-B364-4B91-BBE5-23F04A5EECD2}"/>
-              </a:ext>
-            </a:extLst>
-          </p:cNvPr>
-          <p:cNvSpPr txBox="1"/>
-          <p:nvPr/>
-        </p:nvSpPr>
-        <p:spPr>
-          <a:xfrm>
-            <a:off x="8077200" y="1846816"/>
-            <a:ext cx="3870960" cy="646331"/>
-          </a:xfrm>
-          <a:prstGeom prst="rect">
-            <a:avLst/>
-          </a:prstGeom>
-          <a:noFill/>
-        </p:spPr>
-        <p:txBody>
-          <a:bodyPr wrap="square" rtlCol="0">
-            <a:spAutoFit/>
-          </a:bodyPr>
-          <a:lstStyle/>
-          <a:p>
-            <a:r>
-              <a:rPr lang="it-IT" dirty="0"/>
-              <a:t>Here T2 and v </a:t>
-            </a:r>
-            <a:r>
-              <a:rPr lang="it-IT" dirty="0" err="1"/>
-              <a:t>maps</a:t>
-            </a:r>
-            <a:endParaRPr lang="it-IT" dirty="0"/>
-          </a:p>
-          <a:p>
-            <a:endParaRPr lang="fr-FR" dirty="0"/>
-          </a:p>
-        </p:txBody>
-      </p:sp>
     </p:spTree>
-    <p:extLst>
-      <p:ext uri="{BB962C8B-B14F-4D97-AF65-F5344CB8AC3E}">
-        <p14:creationId xmlns:p14="http://schemas.microsoft.com/office/powerpoint/2010/main" val="1081287535"/>
-      </p:ext>
-    </p:extLst>
   </p:cSld>
   <p:clrMapOvr>
     <a:masterClrMapping/>
@@ -8754,13 +8495,689 @@
       </p:grpSpPr>
       <p:sp>
         <p:nvSpPr>
-          <p:cNvPr id="2" name="Titolo 1">
-            <a:extLst>
-              <a:ext uri="{FF2B5EF4-FFF2-40B4-BE49-F238E27FC236}">
-                <a16:creationId xmlns:a16="http://schemas.microsoft.com/office/drawing/2014/main" id="{23C6001B-ED35-4D6D-A572-465A78ADA6FE}"/>
-              </a:ext>
-            </a:extLst>
-          </p:cNvPr>
+          <p:cNvPr id="2" name="Titolo 1"/>
+          <p:cNvSpPr>
+            <a:spLocks noGrp="1"/>
+          </p:cNvSpPr>
+          <p:nvPr>
+            <p:ph type="title"/>
+          </p:nvPr>
+        </p:nvSpPr>
+        <p:spPr>
+          <a:xfrm>
+            <a:off x="645130" y="109818"/>
+            <a:ext cx="9404723" cy="1117002"/>
+          </a:xfrm>
+        </p:spPr>
+        <p:txBody>
+          <a:bodyPr/>
+          <a:lstStyle/>
+          <a:p>
+            <a:pPr algn="ctr"/>
+            <a:r>
+              <a:rPr lang="it-IT" sz="5400" b="1" dirty="0"/>
+              <a:t>Two </a:t>
+            </a:r>
+            <a:r>
+              <a:rPr lang="it-IT" sz="5400" b="1" dirty="0" err="1"/>
+              <a:t>compartments</a:t>
+            </a:r>
+            <a:r>
+              <a:rPr lang="it-IT" sz="5400" b="1" dirty="0"/>
+              <a:t> model</a:t>
+            </a:r>
+            <a:endParaRPr lang="fr-FR" sz="5400" b="1" dirty="0"/>
+          </a:p>
+        </p:txBody>
+      </p:sp>
+      <p:sp>
+        <p:nvSpPr>
+          <p:cNvPr id="4" name="CasellaDiTesto 3"/>
+          <p:cNvSpPr txBox="1"/>
+          <p:nvPr/>
+        </p:nvSpPr>
+        <p:spPr>
+          <a:xfrm>
+            <a:off x="1262380" y="1200150"/>
+            <a:ext cx="7706995" cy="368300"/>
+          </a:xfrm>
+          <a:prstGeom prst="rect">
+            <a:avLst/>
+          </a:prstGeom>
+          <a:noFill/>
+        </p:spPr>
+        <p:txBody>
+          <a:bodyPr wrap="square" rtlCol="0">
+            <a:spAutoFit/>
+          </a:bodyPr>
+          <a:lstStyle/>
+          <a:p>
+            <a:pPr marL="285750" indent="-285750">
+              <a:buFont typeface="Arial" panose="020B0704020202020204" pitchFamily="34" charset="0"/>
+              <a:buChar char="•"/>
+            </a:pPr>
+            <a:r>
+              <a:rPr lang="en-US" dirty="0"/>
+              <a:t>The average value and confidence intervals of CSF, GM, WM</a:t>
+            </a:r>
+            <a:endParaRPr lang="fr-FR" dirty="0"/>
+          </a:p>
+        </p:txBody>
+      </p:sp>
+      <p:graphicFrame>
+        <p:nvGraphicFramePr>
+          <p:cNvPr id="7" name="Tabella 11"/>
+          <p:cNvGraphicFramePr>
+            <a:graphicFrameLocks noGrp="1"/>
+          </p:cNvGraphicFramePr>
+          <p:nvPr>
+            <p:custDataLst>
+              <p:tags r:id="rId1"/>
+            </p:custDataLst>
+          </p:nvPr>
+        </p:nvGraphicFramePr>
+        <p:xfrm>
+          <a:off x="1593850" y="1955800"/>
+          <a:ext cx="7508240" cy="3989070"/>
+        </p:xfrm>
+        <a:graphic>
+          <a:graphicData uri="http://schemas.openxmlformats.org/drawingml/2006/table">
+            <a:tbl>
+              <a:tblPr firstRow="1" bandRow="1">
+                <a:tableStyleId>{7DF18680-E054-41AD-8BC1-D1AEF772440D}</a:tableStyleId>
+              </a:tblPr>
+              <a:tblGrid>
+                <a:gridCol w="1712595"/>
+                <a:gridCol w="1611630"/>
+                <a:gridCol w="1622425"/>
+                <a:gridCol w="2561590"/>
+              </a:tblGrid>
+              <a:tr h="651510">
+                <a:tc>
+                  <a:txBody>
+                    <a:bodyPr/>
+                    <a:p>
+                      <a:pPr algn="ctr"/>
+                      <a:r>
+                        <a:rPr lang="it-IT" dirty="0"/>
+                        <a:t>STRUCTURE</a:t>
+                      </a:r>
+                      <a:endParaRPr lang="fr-FR" dirty="0"/>
+                    </a:p>
+                  </a:txBody>
+                  <a:tcPr anchor="ctr" anchorCtr="0"/>
+                </a:tc>
+                <a:tc>
+                  <a:txBody>
+                    <a:bodyPr/>
+                    <a:p>
+                      <a:pPr algn="ctr"/>
+                      <a:r>
+                        <a:rPr lang="en-US" altLang="it-IT" dirty="0"/>
+                        <a:t>P</a:t>
+                      </a:r>
+                      <a:r>
+                        <a:rPr lang="en-US" altLang="it-IT" dirty="0"/>
+                        <a:t>arameter</a:t>
+                      </a:r>
+                      <a:endParaRPr lang="en-US" altLang="it-IT" dirty="0"/>
+                    </a:p>
+                  </a:txBody>
+                  <a:tcPr anchor="ctr" anchorCtr="0"/>
+                </a:tc>
+                <a:tc>
+                  <a:txBody>
+                    <a:bodyPr/>
+                    <a:p>
+                      <a:pPr algn="ctr"/>
+                      <a:r>
+                        <a:rPr lang="en-US" altLang="it-IT" dirty="0"/>
+                        <a:t>Mean</a:t>
+                      </a:r>
+                      <a:endParaRPr lang="en-US" altLang="it-IT" dirty="0"/>
+                    </a:p>
+                  </a:txBody>
+                  <a:tcPr anchor="ctr" anchorCtr="0"/>
+                </a:tc>
+                <a:tc>
+                  <a:txBody>
+                    <a:bodyPr/>
+                    <a:p>
+                      <a:pPr algn="ctr"/>
+                      <a:r>
+                        <a:rPr lang="en-US" altLang="it-IT" dirty="0"/>
+                        <a:t>Confidence intervals</a:t>
+                      </a:r>
+                      <a:endParaRPr lang="en-US" altLang="it-IT" dirty="0"/>
+                    </a:p>
+                  </a:txBody>
+                  <a:tcPr anchor="ctr" anchorCtr="0"/>
+                </a:tc>
+              </a:tr>
+              <a:tr h="370840">
+                <a:tc rowSpan="3">
+                  <a:txBody>
+                    <a:bodyPr/>
+                    <a:p>
+                      <a:pPr algn="l"/>
+                      <a:r>
+                        <a:rPr lang="it-IT" dirty="0"/>
+                        <a:t>WM</a:t>
+                      </a:r>
+                      <a:endParaRPr lang="fr-FR" dirty="0"/>
+                    </a:p>
+                  </a:txBody>
+                  <a:tcPr anchor="ctr" anchorCtr="0"/>
+                </a:tc>
+                <a:tc>
+                  <a:txBody>
+                    <a:bodyPr/>
+                    <a:p>
+                      <a:pPr algn="l"/>
+                      <a:r>
+                        <a:rPr lang="en-US" altLang="fr-FR"/>
+                        <a:t>T2 (short)</a:t>
+                      </a:r>
+                      <a:endParaRPr lang="en-US" altLang="fr-FR"/>
+                    </a:p>
+                  </a:txBody>
+                  <a:tcPr anchor="ctr" anchorCtr="0"/>
+                </a:tc>
+                <a:tc>
+                  <a:txBody>
+                    <a:bodyPr/>
+                    <a:p>
+                      <a:pPr algn="l"/>
+                      <a:r>
+                        <a:rPr lang="en-US" altLang="fr-FR" dirty="0"/>
+                        <a:t>35.24</a:t>
+                      </a:r>
+                      <a:endParaRPr lang="en-US" altLang="fr-FR" dirty="0"/>
+                    </a:p>
+                  </a:txBody>
+                  <a:tcPr anchor="ctr" anchorCtr="0"/>
+                </a:tc>
+                <a:tc>
+                  <a:txBody>
+                    <a:bodyPr/>
+                    <a:p>
+                      <a:pPr algn="l"/>
+                      <a:r>
+                        <a:rPr lang="en-US" altLang="zh-CN"/>
+                        <a:t>35.114 - 35.372</a:t>
+                      </a:r>
+                      <a:endParaRPr lang="en-US" altLang="zh-CN"/>
+                    </a:p>
+                  </a:txBody>
+                  <a:tcPr anchor="ctr" anchorCtr="0"/>
+                </a:tc>
+              </a:tr>
+              <a:tr h="370840">
+                <a:tc vMerge="1">
+                  <a:tcPr/>
+                </a:tc>
+                <a:tc>
+                  <a:txBody>
+                    <a:bodyPr/>
+                    <a:p>
+                      <a:pPr algn="l">
+                        <a:buNone/>
+                      </a:pPr>
+                      <a:r>
+                        <a:rPr lang="en-US" altLang="fr-FR"/>
+                        <a:t>T2 (long)</a:t>
+                      </a:r>
+                      <a:endParaRPr lang="en-US" altLang="fr-FR"/>
+                    </a:p>
+                  </a:txBody>
+                  <a:tcPr anchor="ctr" anchorCtr="0"/>
+                </a:tc>
+                <a:tc>
+                  <a:txBody>
+                    <a:bodyPr/>
+                    <a:p>
+                      <a:pPr algn="l">
+                        <a:buNone/>
+                      </a:pPr>
+                      <a:r>
+                        <a:rPr lang="en-US" altLang="fr-FR" dirty="0"/>
+                        <a:t>81.50</a:t>
+                      </a:r>
+                      <a:endParaRPr lang="en-US" altLang="fr-FR" dirty="0"/>
+                    </a:p>
+                  </a:txBody>
+                  <a:tcPr anchor="ctr" anchorCtr="0"/>
+                </a:tc>
+                <a:tc>
+                  <a:txBody>
+                    <a:bodyPr/>
+                    <a:p>
+                      <a:pPr algn="l">
+                        <a:buNone/>
+                      </a:pPr>
+                      <a:r>
+                        <a:rPr lang="en-US" altLang="zh-CN"/>
+                        <a:t>81.191 - 81.816 </a:t>
+                      </a:r>
+                      <a:endParaRPr lang="en-US" altLang="zh-CN"/>
+                    </a:p>
+                  </a:txBody>
+                  <a:tcPr anchor="ctr" anchorCtr="0"/>
+                </a:tc>
+              </a:tr>
+              <a:tr h="370840">
+                <a:tc vMerge="1">
+                  <a:tcPr/>
+                </a:tc>
+                <a:tc>
+                  <a:txBody>
+                    <a:bodyPr/>
+                    <a:p>
+                      <a:pPr algn="l">
+                        <a:buNone/>
+                      </a:pPr>
+                      <a:r>
+                        <a:rPr lang="en-US" altLang="fr-FR"/>
+                        <a:t>V</a:t>
+                      </a:r>
+                      <a:endParaRPr lang="en-US" altLang="fr-FR"/>
+                    </a:p>
+                  </a:txBody>
+                  <a:tcPr anchor="ctr" anchorCtr="0"/>
+                </a:tc>
+                <a:tc>
+                  <a:txBody>
+                    <a:bodyPr/>
+                    <a:p>
+                      <a:pPr algn="l">
+                        <a:buNone/>
+                      </a:pPr>
+                      <a:r>
+                        <a:rPr lang="en-US" altLang="fr-FR" dirty="0"/>
+                        <a:t>0.313</a:t>
+                      </a:r>
+                      <a:endParaRPr lang="en-US" altLang="fr-FR" dirty="0"/>
+                    </a:p>
+                  </a:txBody>
+                  <a:tcPr anchor="ctr" anchorCtr="0"/>
+                </a:tc>
+                <a:tc>
+                  <a:txBody>
+                    <a:bodyPr/>
+                    <a:p>
+                      <a:pPr algn="l">
+                        <a:buNone/>
+                      </a:pPr>
+                      <a:r>
+                        <a:rPr lang="en-US" altLang="zh-CN"/>
+                        <a:t> 0.311 - 0.314 </a:t>
+                      </a:r>
+                      <a:endParaRPr lang="en-US" altLang="zh-CN"/>
+                    </a:p>
+                  </a:txBody>
+                  <a:tcPr anchor="ctr" anchorCtr="0"/>
+                </a:tc>
+              </a:tr>
+              <a:tr h="370840">
+                <a:tc rowSpan="3">
+                  <a:txBody>
+                    <a:bodyPr/>
+                    <a:p>
+                      <a:pPr algn="l"/>
+                      <a:r>
+                        <a:rPr lang="it-IT" dirty="0"/>
+                        <a:t>GM</a:t>
+                      </a:r>
+                      <a:endParaRPr lang="fr-FR" dirty="0"/>
+                    </a:p>
+                  </a:txBody>
+                  <a:tcPr anchor="ctr" anchorCtr="0"/>
+                </a:tc>
+                <a:tc>
+                  <a:txBody>
+                    <a:bodyPr/>
+                    <a:p>
+                      <a:pPr algn="l"/>
+                      <a:r>
+                        <a:rPr lang="en-US" altLang="fr-FR"/>
+                        <a:t>T2 (short)</a:t>
+                      </a:r>
+                      <a:endParaRPr lang="en-US" altLang="fr-FR"/>
+                    </a:p>
+                  </a:txBody>
+                  <a:tcPr anchor="ctr" anchorCtr="0"/>
+                </a:tc>
+                <a:tc>
+                  <a:txBody>
+                    <a:bodyPr/>
+                    <a:p>
+                      <a:pPr algn="l"/>
+                      <a:r>
+                        <a:rPr lang="en-US" altLang="fr-FR" dirty="0"/>
+                        <a:t>34.193</a:t>
+                      </a:r>
+                      <a:endParaRPr lang="en-US" altLang="fr-FR" dirty="0"/>
+                    </a:p>
+                  </a:txBody>
+                  <a:tcPr anchor="ctr" anchorCtr="0"/>
+                </a:tc>
+                <a:tc>
+                  <a:txBody>
+                    <a:bodyPr/>
+                    <a:p>
+                      <a:pPr algn="l"/>
+                      <a:r>
+                        <a:rPr lang="en-US" altLang="zh-CN"/>
+                        <a:t>34.051 - 34.336</a:t>
+                      </a:r>
+                      <a:endParaRPr lang="en-US" altLang="zh-CN"/>
+                    </a:p>
+                  </a:txBody>
+                  <a:tcPr anchor="ctr" anchorCtr="0"/>
+                </a:tc>
+              </a:tr>
+              <a:tr h="370840">
+                <a:tc vMerge="1">
+                  <a:tcPr/>
+                </a:tc>
+                <a:tc>
+                  <a:txBody>
+                    <a:bodyPr/>
+                    <a:p>
+                      <a:pPr algn="l">
+                        <a:buNone/>
+                      </a:pPr>
+                      <a:r>
+                        <a:rPr lang="en-US" altLang="fr-FR"/>
+                        <a:t>T2 (long)</a:t>
+                      </a:r>
+                      <a:endParaRPr lang="en-US" altLang="fr-FR"/>
+                    </a:p>
+                  </a:txBody>
+                  <a:tcPr anchor="ctr" anchorCtr="0"/>
+                </a:tc>
+                <a:tc>
+                  <a:txBody>
+                    <a:bodyPr/>
+                    <a:p>
+                      <a:pPr algn="l">
+                        <a:buNone/>
+                      </a:pPr>
+                      <a:r>
+                        <a:rPr lang="en-US" altLang="fr-FR" dirty="0"/>
+                        <a:t>116.99</a:t>
+                      </a:r>
+                      <a:endParaRPr lang="en-US" altLang="fr-FR" dirty="0"/>
+                    </a:p>
+                  </a:txBody>
+                  <a:tcPr anchor="ctr" anchorCtr="0"/>
+                </a:tc>
+                <a:tc>
+                  <a:txBody>
+                    <a:bodyPr/>
+                    <a:p>
+                      <a:pPr algn="l">
+                        <a:buNone/>
+                      </a:pPr>
+                      <a:r>
+                        <a:rPr lang="en-US" altLang="zh-CN"/>
+                        <a:t>115.940 - 118.056 </a:t>
+                      </a:r>
+                      <a:endParaRPr lang="en-US" altLang="zh-CN"/>
+                    </a:p>
+                  </a:txBody>
+                  <a:tcPr anchor="ctr" anchorCtr="0"/>
+                </a:tc>
+              </a:tr>
+              <a:tr h="370840">
+                <a:tc vMerge="1">
+                  <a:tcPr/>
+                </a:tc>
+                <a:tc>
+                  <a:txBody>
+                    <a:bodyPr/>
+                    <a:p>
+                      <a:pPr algn="l">
+                        <a:buNone/>
+                      </a:pPr>
+                      <a:r>
+                        <a:rPr lang="en-US" altLang="fr-FR"/>
+                        <a:t>V</a:t>
+                      </a:r>
+                      <a:endParaRPr lang="en-US" altLang="fr-FR"/>
+                    </a:p>
+                  </a:txBody>
+                  <a:tcPr anchor="ctr" anchorCtr="0"/>
+                </a:tc>
+                <a:tc>
+                  <a:txBody>
+                    <a:bodyPr/>
+                    <a:p>
+                      <a:pPr algn="l">
+                        <a:buNone/>
+                      </a:pPr>
+                      <a:r>
+                        <a:rPr lang="en-US" altLang="fr-FR" dirty="0"/>
+                        <a:t>0.267</a:t>
+                      </a:r>
+                      <a:endParaRPr lang="en-US" altLang="fr-FR" dirty="0"/>
+                    </a:p>
+                  </a:txBody>
+                  <a:tcPr anchor="ctr" anchorCtr="0"/>
+                </a:tc>
+                <a:tc>
+                  <a:txBody>
+                    <a:bodyPr/>
+                    <a:p>
+                      <a:pPr algn="l">
+                        <a:buNone/>
+                      </a:pPr>
+                      <a:r>
+                        <a:rPr lang="en-US" altLang="zh-CN"/>
+                        <a:t>0.266 - 0.269</a:t>
+                      </a:r>
+                      <a:endParaRPr lang="en-US" altLang="zh-CN"/>
+                    </a:p>
+                  </a:txBody>
+                  <a:tcPr anchor="ctr" anchorCtr="0"/>
+                </a:tc>
+              </a:tr>
+              <a:tr h="370840">
+                <a:tc rowSpan="3">
+                  <a:txBody>
+                    <a:bodyPr/>
+                    <a:p>
+                      <a:pPr algn="l"/>
+                      <a:r>
+                        <a:rPr lang="it-IT" dirty="0"/>
+                        <a:t>CSF</a:t>
+                      </a:r>
+                      <a:endParaRPr lang="fr-FR" dirty="0"/>
+                    </a:p>
+                  </a:txBody>
+                  <a:tcPr anchor="ctr" anchorCtr="0"/>
+                </a:tc>
+                <a:tc>
+                  <a:txBody>
+                    <a:bodyPr/>
+                    <a:p>
+                      <a:pPr algn="l"/>
+                      <a:r>
+                        <a:rPr lang="en-US" altLang="fr-FR"/>
+                        <a:t>T2 (short)</a:t>
+                      </a:r>
+                      <a:endParaRPr lang="en-US" altLang="fr-FR"/>
+                    </a:p>
+                  </a:txBody>
+                  <a:tcPr anchor="ctr" anchorCtr="0"/>
+                </a:tc>
+                <a:tc>
+                  <a:txBody>
+                    <a:bodyPr/>
+                    <a:p>
+                      <a:pPr algn="l"/>
+                      <a:r>
+                        <a:rPr lang="en-US" altLang="fr-FR" dirty="0"/>
+                        <a:t>31.2</a:t>
+                      </a:r>
+                      <a:endParaRPr lang="en-US" altLang="fr-FR" dirty="0"/>
+                    </a:p>
+                  </a:txBody>
+                  <a:tcPr anchor="ctr" anchorCtr="0"/>
+                </a:tc>
+                <a:tc>
+                  <a:txBody>
+                    <a:bodyPr/>
+                    <a:p>
+                      <a:pPr algn="l"/>
+                      <a:r>
+                        <a:rPr lang="en-US" altLang="zh-CN"/>
+                        <a:t>30.996 - 31.404</a:t>
+                      </a:r>
+                      <a:endParaRPr lang="en-US" altLang="zh-CN"/>
+                    </a:p>
+                  </a:txBody>
+                  <a:tcPr anchor="ctr" anchorCtr="0"/>
+                </a:tc>
+              </a:tr>
+              <a:tr h="370840">
+                <a:tc vMerge="1">
+                  <a:tcPr/>
+                </a:tc>
+                <a:tc>
+                  <a:txBody>
+                    <a:bodyPr/>
+                    <a:p>
+                      <a:pPr algn="l">
+                        <a:buNone/>
+                      </a:pPr>
+                      <a:r>
+                        <a:rPr lang="en-US" altLang="fr-FR"/>
+                        <a:t>T2 (long)</a:t>
+                      </a:r>
+                      <a:endParaRPr lang="en-US" altLang="fr-FR"/>
+                    </a:p>
+                  </a:txBody>
+                  <a:tcPr anchor="ctr" anchorCtr="0"/>
+                </a:tc>
+                <a:tc>
+                  <a:txBody>
+                    <a:bodyPr/>
+                    <a:p>
+                      <a:pPr algn="l">
+                        <a:buNone/>
+                      </a:pPr>
+                      <a:r>
+                        <a:rPr lang="en-US" altLang="fr-FR" dirty="0"/>
+                        <a:t>529.43</a:t>
+                      </a:r>
+                      <a:endParaRPr lang="en-US" altLang="fr-FR" dirty="0"/>
+                    </a:p>
+                  </a:txBody>
+                  <a:tcPr anchor="ctr" anchorCtr="0"/>
+                </a:tc>
+                <a:tc>
+                  <a:txBody>
+                    <a:bodyPr/>
+                    <a:p>
+                      <a:pPr algn="l">
+                        <a:buNone/>
+                      </a:pPr>
+                      <a:r>
+                        <a:rPr lang="en-US" altLang="zh-CN"/>
+                        <a:t>521.052 - 537.810</a:t>
+                      </a:r>
+                      <a:endParaRPr lang="en-US" altLang="zh-CN"/>
+                    </a:p>
+                  </a:txBody>
+                  <a:tcPr anchor="ctr" anchorCtr="0"/>
+                </a:tc>
+              </a:tr>
+              <a:tr h="370840">
+                <a:tc vMerge="1">
+                  <a:tcPr/>
+                </a:tc>
+                <a:tc>
+                  <a:txBody>
+                    <a:bodyPr/>
+                    <a:p>
+                      <a:pPr algn="l">
+                        <a:buNone/>
+                      </a:pPr>
+                      <a:r>
+                        <a:rPr lang="en-US" altLang="fr-FR"/>
+                        <a:t>V</a:t>
+                      </a:r>
+                      <a:endParaRPr lang="en-US" altLang="fr-FR"/>
+                    </a:p>
+                  </a:txBody>
+                  <a:tcPr anchor="ctr" anchorCtr="0"/>
+                </a:tc>
+                <a:tc>
+                  <a:txBody>
+                    <a:bodyPr/>
+                    <a:p>
+                      <a:pPr algn="l">
+                        <a:buNone/>
+                      </a:pPr>
+                      <a:r>
+                        <a:rPr lang="en-US" altLang="fr-FR" dirty="0"/>
+                        <a:t>0.279</a:t>
+                      </a:r>
+                      <a:endParaRPr lang="en-US" altLang="fr-FR" dirty="0"/>
+                    </a:p>
+                  </a:txBody>
+                  <a:tcPr anchor="ctr" anchorCtr="0"/>
+                </a:tc>
+                <a:tc>
+                  <a:txBody>
+                    <a:bodyPr/>
+                    <a:p>
+                      <a:pPr algn="l">
+                        <a:buNone/>
+                      </a:pPr>
+                      <a:r>
+                        <a:rPr lang="en-US" altLang="zh-CN"/>
+                        <a:t>0.277 - 0.281 </a:t>
+                      </a:r>
+                      <a:endParaRPr lang="en-US" altLang="zh-CN"/>
+                    </a:p>
+                  </a:txBody>
+                  <a:tcPr anchor="ctr" anchorCtr="0"/>
+                </a:tc>
+              </a:tr>
+            </a:tbl>
+          </a:graphicData>
+        </a:graphic>
+      </p:graphicFrame>
+    </p:spTree>
+  </p:cSld>
+  <p:clrMapOvr>
+    <a:masterClrMapping/>
+  </p:clrMapOvr>
+</p:sld>
+</file>
+
+<file path=ppt/slides/slide8.xml><?xml version="1.0" encoding="utf-8"?>
+<p:sld xmlns:a="http://schemas.openxmlformats.org/drawingml/2006/main" xmlns:r="http://schemas.openxmlformats.org/officeDocument/2006/relationships" xmlns:p="http://schemas.openxmlformats.org/presentationml/2006/main">
+  <p:cSld>
+    <p:spTree>
+      <p:nvGrpSpPr>
+        <p:cNvPr id="1" name=""/>
+        <p:cNvGrpSpPr/>
+        <p:nvPr/>
+      </p:nvGrpSpPr>
+      <p:grpSpPr>
+        <a:xfrm>
+          <a:off x="0" y="0"/>
+          <a:ext cx="0" cy="0"/>
+          <a:chOff x="0" y="0"/>
+          <a:chExt cx="0" cy="0"/>
+        </a:xfrm>
+      </p:grpSpPr>
+      <p:sp>
+        <p:nvSpPr>
+          <p:cNvPr id="2" name="Titolo 1"/>
           <p:cNvSpPr>
             <a:spLocks noGrp="1"/>
           </p:cNvSpPr>
@@ -8797,13 +9214,7 @@
       </p:sp>
       <p:sp>
         <p:nvSpPr>
-          <p:cNvPr id="5" name="CasellaDiTesto 4">
-            <a:extLst>
-              <a:ext uri="{FF2B5EF4-FFF2-40B4-BE49-F238E27FC236}">
-                <a16:creationId xmlns:a16="http://schemas.microsoft.com/office/drawing/2014/main" id="{73AE9BD9-1849-4DCB-8A19-865A407A2499}"/>
-              </a:ext>
-            </a:extLst>
-          </p:cNvPr>
+          <p:cNvPr id="5" name="CasellaDiTesto 4"/>
           <p:cNvSpPr txBox="1"/>
           <p:nvPr/>
         </p:nvSpPr>
@@ -8893,23 +9304,11 @@
       </p:sp>
       <p:graphicFrame>
         <p:nvGraphicFramePr>
-          <p:cNvPr id="6" name="Tabella 5">
-            <a:extLst>
-              <a:ext uri="{FF2B5EF4-FFF2-40B4-BE49-F238E27FC236}">
-                <a16:creationId xmlns:a16="http://schemas.microsoft.com/office/drawing/2014/main" id="{F02FD0C4-D08F-4362-872A-1AA7BB291F07}"/>
-              </a:ext>
-            </a:extLst>
-          </p:cNvPr>
+          <p:cNvPr id="6" name="Tabella 5"/>
           <p:cNvGraphicFramePr>
             <a:graphicFrameLocks noGrp="1"/>
           </p:cNvGraphicFramePr>
-          <p:nvPr>
-            <p:extLst>
-              <p:ext uri="{D42A27DB-BD31-4B8C-83A1-F6EECF244321}">
-                <p14:modId xmlns:p14="http://schemas.microsoft.com/office/powerpoint/2010/main" val="1883178295"/>
-              </p:ext>
-            </p:extLst>
-          </p:nvPr>
+          <p:nvPr/>
         </p:nvGraphicFramePr>
         <p:xfrm>
           <a:off x="546100" y="4682066"/>
@@ -8922,27 +9321,9 @@
                 <a:tableStyleId>{7DF18680-E054-41AD-8BC1-D1AEF772440D}</a:tableStyleId>
               </a:tblPr>
               <a:tblGrid>
-                <a:gridCol w="2709333">
-                  <a:extLst>
-                    <a:ext uri="{9D8B030D-6E8A-4147-A177-3AD203B41FA5}">
-                      <a16:colId xmlns:a16="http://schemas.microsoft.com/office/drawing/2014/main" val="3532203324"/>
-                    </a:ext>
-                  </a:extLst>
-                </a:gridCol>
-                <a:gridCol w="1667087">
-                  <a:extLst>
-                    <a:ext uri="{9D8B030D-6E8A-4147-A177-3AD203B41FA5}">
-                      <a16:colId xmlns:a16="http://schemas.microsoft.com/office/drawing/2014/main" val="4027703557"/>
-                    </a:ext>
-                  </a:extLst>
-                </a:gridCol>
-                <a:gridCol w="1242060">
-                  <a:extLst>
-                    <a:ext uri="{9D8B030D-6E8A-4147-A177-3AD203B41FA5}">
-                      <a16:colId xmlns:a16="http://schemas.microsoft.com/office/drawing/2014/main" val="3792496693"/>
-                    </a:ext>
-                  </a:extLst>
-                </a:gridCol>
+                <a:gridCol w="2709333"/>
+                <a:gridCol w="1667087"/>
+                <a:gridCol w="1242060"/>
               </a:tblGrid>
               <a:tr h="370840">
                 <a:tc>
@@ -8987,11 +9368,6 @@
                   </a:txBody>
                   <a:tcPr/>
                 </a:tc>
-                <a:extLst>
-                  <a:ext uri="{0D108BD9-81ED-4DB2-BD59-A6C34878D82A}">
-                    <a16:rowId xmlns:a16="http://schemas.microsoft.com/office/drawing/2014/main" val="3209439112"/>
-                  </a:ext>
-                </a:extLst>
               </a:tr>
               <a:tr h="370840">
                 <a:tc>
@@ -9024,11 +9400,6 @@
                   </a:txBody>
                   <a:tcPr/>
                 </a:tc>
-                <a:extLst>
-                  <a:ext uri="{0D108BD9-81ED-4DB2-BD59-A6C34878D82A}">
-                    <a16:rowId xmlns:a16="http://schemas.microsoft.com/office/drawing/2014/main" val="818534469"/>
-                  </a:ext>
-                </a:extLst>
               </a:tr>
               <a:tr h="370840">
                 <a:tc>
@@ -9061,214 +9432,12 @@
                   </a:txBody>
                   <a:tcPr/>
                 </a:tc>
-                <a:extLst>
-                  <a:ext uri="{0D108BD9-81ED-4DB2-BD59-A6C34878D82A}">
-                    <a16:rowId xmlns:a16="http://schemas.microsoft.com/office/drawing/2014/main" val="1059009906"/>
-                  </a:ext>
-                </a:extLst>
               </a:tr>
             </a:tbl>
           </a:graphicData>
         </a:graphic>
       </p:graphicFrame>
     </p:spTree>
-    <p:extLst>
-      <p:ext uri="{BB962C8B-B14F-4D97-AF65-F5344CB8AC3E}">
-        <p14:creationId xmlns:p14="http://schemas.microsoft.com/office/powerpoint/2010/main" val="2282006907"/>
-      </p:ext>
-    </p:extLst>
-  </p:cSld>
-  <p:clrMapOvr>
-    <a:masterClrMapping/>
-  </p:clrMapOvr>
-</p:sld>
-</file>
-
-<file path=ppt/slides/slide8.xml><?xml version="1.0" encoding="utf-8"?>
-<p:sld xmlns:a="http://schemas.openxmlformats.org/drawingml/2006/main" xmlns:r="http://schemas.openxmlformats.org/officeDocument/2006/relationships" xmlns:p="http://schemas.openxmlformats.org/presentationml/2006/main">
-  <p:cSld>
-    <p:spTree>
-      <p:nvGrpSpPr>
-        <p:cNvPr id="1" name=""/>
-        <p:cNvGrpSpPr/>
-        <p:nvPr/>
-      </p:nvGrpSpPr>
-      <p:grpSpPr>
-        <a:xfrm>
-          <a:off x="0" y="0"/>
-          <a:ext cx="0" cy="0"/>
-          <a:chOff x="0" y="0"/>
-          <a:chExt cx="0" cy="0"/>
-        </a:xfrm>
-      </p:grpSpPr>
-      <p:sp>
-        <p:nvSpPr>
-          <p:cNvPr id="2" name="Titolo 1">
-            <a:extLst>
-              <a:ext uri="{FF2B5EF4-FFF2-40B4-BE49-F238E27FC236}">
-                <a16:creationId xmlns:a16="http://schemas.microsoft.com/office/drawing/2014/main" id="{22152FA5-55B1-47A7-BC59-90FB62554D0D}"/>
-              </a:ext>
-            </a:extLst>
-          </p:cNvPr>
-          <p:cNvSpPr>
-            <a:spLocks noGrp="1"/>
-          </p:cNvSpPr>
-          <p:nvPr>
-            <p:ph type="title"/>
-          </p:nvPr>
-        </p:nvSpPr>
-        <p:spPr/>
-        <p:txBody>
-          <a:bodyPr/>
-          <a:lstStyle/>
-          <a:p>
-            <a:pPr algn="ctr"/>
-            <a:r>
-              <a:rPr lang="fr-FR" sz="5400" b="1" dirty="0" err="1"/>
-              <a:t>Further</a:t>
-            </a:r>
-            <a:r>
-              <a:rPr lang="fr-FR" sz="5400" b="1" dirty="0"/>
-              <a:t> </a:t>
-            </a:r>
-            <a:r>
-              <a:rPr lang="fr-FR" sz="5400" b="1" dirty="0" err="1"/>
-              <a:t>research</a:t>
-            </a:r>
-            <a:r>
-              <a:rPr lang="fr-FR" sz="5400" b="1" dirty="0"/>
-              <a:t> directions</a:t>
-            </a:r>
-          </a:p>
-        </p:txBody>
-      </p:sp>
-      <p:sp>
-        <p:nvSpPr>
-          <p:cNvPr id="4" name="CasellaDiTesto 3">
-            <a:extLst>
-              <a:ext uri="{FF2B5EF4-FFF2-40B4-BE49-F238E27FC236}">
-                <a16:creationId xmlns:a16="http://schemas.microsoft.com/office/drawing/2014/main" id="{247EA1C0-8D5D-4728-834B-2CED2927A23C}"/>
-              </a:ext>
-            </a:extLst>
-          </p:cNvPr>
-          <p:cNvSpPr txBox="1"/>
-          <p:nvPr/>
-        </p:nvSpPr>
-        <p:spPr>
-          <a:xfrm>
-            <a:off x="646111" y="1714500"/>
-            <a:ext cx="5044440" cy="1477328"/>
-          </a:xfrm>
-          <a:prstGeom prst="rect">
-            <a:avLst/>
-          </a:prstGeom>
-          <a:noFill/>
-        </p:spPr>
-        <p:txBody>
-          <a:bodyPr wrap="square" rtlCol="0">
-            <a:spAutoFit/>
-          </a:bodyPr>
-          <a:lstStyle/>
-          <a:p>
-            <a:pPr marL="285750" indent="-285750">
-              <a:buFont typeface="Arial" panose="020B0604020202020204" pitchFamily="34" charset="0"/>
-              <a:buChar char="•"/>
-            </a:pPr>
-            <a:r>
-              <a:rPr lang="it-IT" dirty="0"/>
-              <a:t>More </a:t>
-            </a:r>
-            <a:r>
-              <a:rPr lang="it-IT" dirty="0" err="1"/>
-              <a:t>compartments</a:t>
-            </a:r>
-            <a:endParaRPr lang="it-IT" dirty="0"/>
-          </a:p>
-          <a:p>
-            <a:pPr marL="285750" indent="-285750">
-              <a:buFont typeface="Arial" panose="020B0604020202020204" pitchFamily="34" charset="0"/>
-              <a:buChar char="•"/>
-            </a:pPr>
-            <a:r>
-              <a:rPr lang="it-IT" dirty="0" err="1"/>
-              <a:t>Improve</a:t>
-            </a:r>
-            <a:r>
-              <a:rPr lang="it-IT" dirty="0"/>
-              <a:t> the fitting in </a:t>
-            </a:r>
-            <a:r>
-              <a:rPr lang="it-IT" dirty="0" err="1"/>
-              <a:t>presence</a:t>
-            </a:r>
-            <a:r>
-              <a:rPr lang="it-IT" dirty="0"/>
-              <a:t> of </a:t>
-            </a:r>
-            <a:r>
-              <a:rPr lang="it-IT" dirty="0" err="1"/>
-              <a:t>noise</a:t>
-            </a:r>
-            <a:endParaRPr lang="it-IT" dirty="0"/>
-          </a:p>
-          <a:p>
-            <a:pPr marL="285750" indent="-285750">
-              <a:buFont typeface="Arial" panose="020B0604020202020204" pitchFamily="34" charset="0"/>
-              <a:buChar char="•"/>
-            </a:pPr>
-            <a:r>
-              <a:rPr lang="it-IT" dirty="0" err="1"/>
-              <a:t>Differences</a:t>
-            </a:r>
-            <a:r>
-              <a:rPr lang="it-IT" dirty="0"/>
-              <a:t> </a:t>
-            </a:r>
-            <a:r>
-              <a:rPr lang="it-IT" dirty="0" err="1"/>
-              <a:t>between</a:t>
-            </a:r>
-            <a:r>
-              <a:rPr lang="it-IT" dirty="0"/>
-              <a:t> </a:t>
-            </a:r>
-            <a:r>
-              <a:rPr lang="it-IT" dirty="0" err="1"/>
-              <a:t>preterm</a:t>
-            </a:r>
-            <a:r>
-              <a:rPr lang="it-IT" dirty="0"/>
-              <a:t> and full </a:t>
-            </a:r>
-            <a:r>
-              <a:rPr lang="it-IT" dirty="0" err="1"/>
-              <a:t>term</a:t>
-            </a:r>
-            <a:r>
-              <a:rPr lang="it-IT" dirty="0"/>
-              <a:t> </a:t>
-            </a:r>
-            <a:r>
-              <a:rPr lang="it-IT" dirty="0" err="1"/>
-              <a:t>infants</a:t>
-            </a:r>
-            <a:endParaRPr lang="it-IT" dirty="0"/>
-          </a:p>
-          <a:p>
-            <a:pPr marL="285750" indent="-285750">
-              <a:buFont typeface="Arial" panose="020B0604020202020204" pitchFamily="34" charset="0"/>
-              <a:buChar char="•"/>
-            </a:pPr>
-            <a:endParaRPr lang="fr-FR" dirty="0"/>
-          </a:p>
-        </p:txBody>
-      </p:sp>
-    </p:spTree>
-    <p:extLst>
-      <p:ext uri="{BB962C8B-B14F-4D97-AF65-F5344CB8AC3E}">
-        <p14:creationId xmlns:p14="http://schemas.microsoft.com/office/powerpoint/2010/main" val="476370862"/>
-      </p:ext>
-    </p:extLst>
   </p:cSld>
   <p:clrMapOvr>
     <a:masterClrMapping/>
@@ -9295,13 +9464,7 @@
       </p:grpSpPr>
       <p:sp>
         <p:nvSpPr>
-          <p:cNvPr id="2" name="Titolo 1">
-            <a:extLst>
-              <a:ext uri="{FF2B5EF4-FFF2-40B4-BE49-F238E27FC236}">
-                <a16:creationId xmlns:a16="http://schemas.microsoft.com/office/drawing/2014/main" id="{D08361E1-095A-491B-A347-18F73A87D920}"/>
-              </a:ext>
-            </a:extLst>
-          </p:cNvPr>
+          <p:cNvPr id="2" name="Titolo 1"/>
           <p:cNvSpPr>
             <a:spLocks noGrp="1"/>
           </p:cNvSpPr>
@@ -9314,46 +9477,155 @@
           <a:bodyPr/>
           <a:lstStyle/>
           <a:p>
-            <a:endParaRPr lang="fr-FR"/>
-          </a:p>
-        </p:txBody>
-      </p:sp>
-      <p:sp>
-        <p:nvSpPr>
-          <p:cNvPr id="3" name="Segnaposto contenuto 2">
-            <a:extLst>
-              <a:ext uri="{FF2B5EF4-FFF2-40B4-BE49-F238E27FC236}">
-                <a16:creationId xmlns:a16="http://schemas.microsoft.com/office/drawing/2014/main" id="{F134FAA8-3C86-4DE4-AC6A-D4C0A655E06B}"/>
-              </a:ext>
-            </a:extLst>
-          </p:cNvPr>
-          <p:cNvSpPr>
-            <a:spLocks noGrp="1"/>
-          </p:cNvSpPr>
-          <p:nvPr>
-            <p:ph idx="1"/>
-          </p:nvPr>
-        </p:nvSpPr>
-        <p:spPr/>
-        <p:txBody>
-          <a:bodyPr/>
+            <a:pPr algn="ctr"/>
+            <a:r>
+              <a:rPr lang="fr-FR" sz="5400" b="1" dirty="0" err="1"/>
+              <a:t>Further</a:t>
+            </a:r>
+            <a:r>
+              <a:rPr lang="fr-FR" sz="5400" b="1" dirty="0"/>
+              <a:t> </a:t>
+            </a:r>
+            <a:r>
+              <a:rPr lang="fr-FR" sz="5400" b="1" dirty="0" err="1"/>
+              <a:t>research</a:t>
+            </a:r>
+            <a:r>
+              <a:rPr lang="fr-FR" sz="5400" b="1" dirty="0"/>
+              <a:t> directions</a:t>
+            </a:r>
+            <a:endParaRPr lang="fr-FR" sz="5400" b="1" dirty="0"/>
+          </a:p>
+        </p:txBody>
+      </p:sp>
+      <p:sp>
+        <p:nvSpPr>
+          <p:cNvPr id="4" name="CasellaDiTesto 3"/>
+          <p:cNvSpPr txBox="1"/>
+          <p:nvPr/>
+        </p:nvSpPr>
+        <p:spPr>
+          <a:xfrm>
+            <a:off x="646111" y="1714500"/>
+            <a:ext cx="5044440" cy="1477328"/>
+          </a:xfrm>
+          <a:prstGeom prst="rect">
+            <a:avLst/>
+          </a:prstGeom>
+          <a:noFill/>
+        </p:spPr>
+        <p:txBody>
+          <a:bodyPr wrap="square" rtlCol="0">
+            <a:spAutoFit/>
+          </a:bodyPr>
           <a:lstStyle/>
           <a:p>
-            <a:endParaRPr lang="fr-FR"/>
+            <a:pPr marL="285750" indent="-285750">
+              <a:buFont typeface="Arial" panose="020B0704020202020204" pitchFamily="34" charset="0"/>
+              <a:buChar char="•"/>
+            </a:pPr>
+            <a:r>
+              <a:rPr lang="it-IT" dirty="0"/>
+              <a:t>More </a:t>
+            </a:r>
+            <a:r>
+              <a:rPr lang="it-IT" dirty="0" err="1"/>
+              <a:t>compartments</a:t>
+            </a:r>
+            <a:endParaRPr lang="it-IT" dirty="0"/>
+          </a:p>
+          <a:p>
+            <a:pPr marL="285750" indent="-285750">
+              <a:buFont typeface="Arial" panose="020B0704020202020204" pitchFamily="34" charset="0"/>
+              <a:buChar char="•"/>
+            </a:pPr>
+            <a:r>
+              <a:rPr lang="it-IT" dirty="0" err="1"/>
+              <a:t>Improve</a:t>
+            </a:r>
+            <a:r>
+              <a:rPr lang="it-IT" dirty="0"/>
+              <a:t> the fitting in </a:t>
+            </a:r>
+            <a:r>
+              <a:rPr lang="it-IT" dirty="0" err="1"/>
+              <a:t>presence</a:t>
+            </a:r>
+            <a:r>
+              <a:rPr lang="it-IT" dirty="0"/>
+              <a:t> of </a:t>
+            </a:r>
+            <a:r>
+              <a:rPr lang="it-IT" dirty="0" err="1"/>
+              <a:t>noise</a:t>
+            </a:r>
+            <a:endParaRPr lang="it-IT" dirty="0"/>
+          </a:p>
+          <a:p>
+            <a:pPr marL="285750" indent="-285750">
+              <a:buFont typeface="Arial" panose="020B0704020202020204" pitchFamily="34" charset="0"/>
+              <a:buChar char="•"/>
+            </a:pPr>
+            <a:r>
+              <a:rPr lang="it-IT" dirty="0" err="1"/>
+              <a:t>Differences</a:t>
+            </a:r>
+            <a:r>
+              <a:rPr lang="it-IT" dirty="0"/>
+              <a:t> </a:t>
+            </a:r>
+            <a:r>
+              <a:rPr lang="it-IT" dirty="0" err="1"/>
+              <a:t>between</a:t>
+            </a:r>
+            <a:r>
+              <a:rPr lang="it-IT" dirty="0"/>
+              <a:t> </a:t>
+            </a:r>
+            <a:r>
+              <a:rPr lang="it-IT" dirty="0" err="1"/>
+              <a:t>preterm</a:t>
+            </a:r>
+            <a:r>
+              <a:rPr lang="it-IT" dirty="0"/>
+              <a:t> and full </a:t>
+            </a:r>
+            <a:r>
+              <a:rPr lang="it-IT" dirty="0" err="1"/>
+              <a:t>term</a:t>
+            </a:r>
+            <a:r>
+              <a:rPr lang="it-IT" dirty="0"/>
+              <a:t> </a:t>
+            </a:r>
+            <a:r>
+              <a:rPr lang="it-IT" dirty="0" err="1"/>
+              <a:t>infants</a:t>
+            </a:r>
+            <a:endParaRPr lang="it-IT" dirty="0"/>
+          </a:p>
+          <a:p>
+            <a:pPr marL="285750" indent="-285750">
+              <a:buFont typeface="Arial" panose="020B0704020202020204" pitchFamily="34" charset="0"/>
+              <a:buChar char="•"/>
+            </a:pPr>
+            <a:endParaRPr lang="fr-FR" dirty="0"/>
           </a:p>
         </p:txBody>
       </p:sp>
     </p:spTree>
-    <p:extLst>
-      <p:ext uri="{BB962C8B-B14F-4D97-AF65-F5344CB8AC3E}">
-        <p14:creationId xmlns:p14="http://schemas.microsoft.com/office/powerpoint/2010/main" val="2849059625"/>
-      </p:ext>
-    </p:extLst>
   </p:cSld>
   <p:clrMapOvr>
     <a:masterClrMapping/>
   </p:clrMapOvr>
 </p:sld>
+</file>
+
+<file path=ppt/tags/tag1.xml><?xml version="1.0" encoding="utf-8"?>
+<p:tagLst xmlns:p="http://schemas.openxmlformats.org/presentationml/2006/main">
+  <p:tag name="TABLE_ENDDRAG_ORIGIN_RECT" val="668*138"/>
+  <p:tag name="TABLE_ENDDRAG_RECT" val="50*303*668*138"/>
+</p:tagLst>
 </file>
 
 <file path=ppt/theme/theme1.xml><?xml version="1.0" encoding="utf-8"?>
@@ -9399,7 +9671,7 @@
     </a:clrScheme>
     <a:fontScheme name="Ione">
       <a:majorFont>
-        <a:latin typeface="Century Gothic" panose="020B0502020202020204"/>
+        <a:latin typeface="Century Gothic"/>
         <a:ea typeface=""/>
         <a:cs typeface=""/>
         <a:font script="Jpan" typeface="メイリオ"/>
@@ -9434,7 +9706,7 @@
         <a:font script="Geor" typeface="Sylfaen"/>
       </a:majorFont>
       <a:minorFont>
-        <a:latin typeface="Century Gothic" panose="020B0502020202020204"/>
+        <a:latin typeface="Century Gothic"/>
         <a:ea typeface=""/>
         <a:cs typeface=""/>
         <a:font script="Jpan" typeface="メイリオ"/>
@@ -9606,16 +9878,16 @@
               </a:schemeClr>
             </a:duotone>
           </a:blip>
-          <a:stretch/>
+          <a:stretch>
+            <a:fillRect/>
+          </a:stretch>
         </a:blipFill>
       </a:bgFillStyleLst>
     </a:fmtScheme>
   </a:themeElements>
-  <a:objectDefaults/>
-  <a:extraClrSchemeLst/>
   <a:extLst>
     <a:ext uri="{05A4C25C-085E-4340-85A3-A5531E510DB2}">
-      <thm15:themeFamily xmlns:thm15="http://schemas.microsoft.com/office/thememl/2012/main" name="Ion" id="{B8441ADB-2E43-4AF7-B97A-BD870242C6A8}" vid="{BACC050B-8757-4460-95D8-E37B46A6B421}"/>
+      <thm15:themeFamily xmlns:thm15="http://schemas.microsoft.com/office/thememl/2012/main" name="Office Theme" id="{62F939B6-93AF-4DB8-9C6B-D6C7DFDC589F}" vid="{4A3C46E8-61CC-4603-A589-7422A47A8E4A}"/>
     </a:ext>
   </a:extLst>
 </a:theme>
@@ -9664,7 +9936,7 @@
     </a:clrScheme>
     <a:fontScheme name="Office">
       <a:majorFont>
-        <a:latin typeface="Calibri Light" panose="020F0302020204030204"/>
+        <a:latin typeface="Calibri Light"/>
         <a:ea typeface=""/>
         <a:cs typeface=""/>
         <a:font script="Jpan" typeface="游ゴシック Light"/>
@@ -9697,26 +9969,9 @@
         <a:font script="Viet" typeface="Times New Roman"/>
         <a:font script="Uigh" typeface="Microsoft Uighur"/>
         <a:font script="Geor" typeface="Sylfaen"/>
-        <a:font script="Armn" typeface="Arial"/>
-        <a:font script="Bugi" typeface="Leelawadee UI"/>
-        <a:font script="Bopo" typeface="Microsoft JhengHei"/>
-        <a:font script="Java" typeface="Javanese Text"/>
-        <a:font script="Lisu" typeface="Segoe UI"/>
-        <a:font script="Mymr" typeface="Myanmar Text"/>
-        <a:font script="Nkoo" typeface="Ebrima"/>
-        <a:font script="Olck" typeface="Nirmala UI"/>
-        <a:font script="Osma" typeface="Ebrima"/>
-        <a:font script="Phag" typeface="Phagspa"/>
-        <a:font script="Syrn" typeface="Estrangelo Edessa"/>
-        <a:font script="Syrj" typeface="Estrangelo Edessa"/>
-        <a:font script="Syre" typeface="Estrangelo Edessa"/>
-        <a:font script="Sora" typeface="Nirmala UI"/>
-        <a:font script="Tale" typeface="Microsoft Tai Le"/>
-        <a:font script="Talu" typeface="Microsoft New Tai Lue"/>
-        <a:font script="Tfng" typeface="Ebrima"/>
       </a:majorFont>
       <a:minorFont>
-        <a:latin typeface="Calibri" panose="020F0502020204030204"/>
+        <a:latin typeface="Calibri"/>
         <a:ea typeface=""/>
         <a:cs typeface=""/>
         <a:font script="Jpan" typeface="游ゴシック"/>
@@ -9749,23 +10004,6 @@
         <a:font script="Viet" typeface="Arial"/>
         <a:font script="Uigh" typeface="Microsoft Uighur"/>
         <a:font script="Geor" typeface="Sylfaen"/>
-        <a:font script="Armn" typeface="Arial"/>
-        <a:font script="Bugi" typeface="Leelawadee UI"/>
-        <a:font script="Bopo" typeface="Microsoft JhengHei"/>
-        <a:font script="Java" typeface="Javanese Text"/>
-        <a:font script="Lisu" typeface="Segoe UI"/>
-        <a:font script="Mymr" typeface="Myanmar Text"/>
-        <a:font script="Nkoo" typeface="Ebrima"/>
-        <a:font script="Olck" typeface="Nirmala UI"/>
-        <a:font script="Osma" typeface="Ebrima"/>
-        <a:font script="Phag" typeface="Phagspa"/>
-        <a:font script="Syrn" typeface="Estrangelo Edessa"/>
-        <a:font script="Syrj" typeface="Estrangelo Edessa"/>
-        <a:font script="Syre" typeface="Estrangelo Edessa"/>
-        <a:font script="Sora" typeface="Nirmala UI"/>
-        <a:font script="Tale" typeface="Microsoft Tai Le"/>
-        <a:font script="Talu" typeface="Microsoft New Tai Lue"/>
-        <a:font script="Tfng" typeface="Ebrima"/>
       </a:minorFont>
     </a:fontScheme>
     <a:fmtScheme name="Office">
@@ -9906,8 +10144,6 @@
       </a:bgFillStyleLst>
     </a:fmtScheme>
   </a:themeElements>
-  <a:objectDefaults/>
-  <a:extraClrSchemeLst/>
   <a:extLst>
     <a:ext uri="{05A4C25C-085E-4340-85A3-A5531E510DB2}">
       <thm15:themeFamily xmlns:thm15="http://schemas.microsoft.com/office/thememl/2012/main" name="Office Theme" id="{62F939B6-93AF-4DB8-9C6B-D6C7DFDC589F}" vid="{4A3C46E8-61CC-4603-A589-7422A47A8E4A}"/>

</xml_diff>